<commit_message>
Added links to presentation
</commit_message>
<xml_diff>
--- a/workshop_tromsoe.pptx
+++ b/workshop_tromsoe.pptx
@@ -5,10 +5,10 @@
     <p:sldMasterId id="2147483744" r:id="rId4"/>
   </p:sldMasterIdLst>
   <p:notesMasterIdLst>
-    <p:notesMasterId r:id="rId38"/>
+    <p:notesMasterId r:id="rId37"/>
   </p:notesMasterIdLst>
   <p:handoutMasterIdLst>
-    <p:handoutMasterId r:id="rId39"/>
+    <p:handoutMasterId r:id="rId38"/>
   </p:handoutMasterIdLst>
   <p:sldIdLst>
     <p:sldId id="319" r:id="rId5"/>
@@ -16,39 +16,38 @@
     <p:sldId id="352" r:id="rId7"/>
     <p:sldId id="328" r:id="rId8"/>
     <p:sldId id="338" r:id="rId9"/>
-    <p:sldId id="363" r:id="rId10"/>
-    <p:sldId id="365" r:id="rId11"/>
-    <p:sldId id="360" r:id="rId12"/>
-    <p:sldId id="344" r:id="rId13"/>
-    <p:sldId id="366" r:id="rId14"/>
-    <p:sldId id="372" r:id="rId15"/>
-    <p:sldId id="371" r:id="rId16"/>
-    <p:sldId id="373" r:id="rId17"/>
-    <p:sldId id="377" r:id="rId18"/>
-    <p:sldId id="395" r:id="rId19"/>
-    <p:sldId id="396" r:id="rId20"/>
-    <p:sldId id="378" r:id="rId21"/>
-    <p:sldId id="385" r:id="rId22"/>
-    <p:sldId id="386" r:id="rId23"/>
-    <p:sldId id="384" r:id="rId24"/>
-    <p:sldId id="383" r:id="rId25"/>
-    <p:sldId id="380" r:id="rId26"/>
-    <p:sldId id="387" r:id="rId27"/>
-    <p:sldId id="388" r:id="rId28"/>
-    <p:sldId id="391" r:id="rId29"/>
-    <p:sldId id="389" r:id="rId30"/>
-    <p:sldId id="390" r:id="rId31"/>
-    <p:sldId id="392" r:id="rId32"/>
-    <p:sldId id="393" r:id="rId33"/>
-    <p:sldId id="381" r:id="rId34"/>
-    <p:sldId id="394" r:id="rId35"/>
-    <p:sldId id="362" r:id="rId36"/>
-    <p:sldId id="346" r:id="rId37"/>
+    <p:sldId id="365" r:id="rId10"/>
+    <p:sldId id="360" r:id="rId11"/>
+    <p:sldId id="344" r:id="rId12"/>
+    <p:sldId id="397" r:id="rId13"/>
+    <p:sldId id="372" r:id="rId14"/>
+    <p:sldId id="371" r:id="rId15"/>
+    <p:sldId id="373" r:id="rId16"/>
+    <p:sldId id="377" r:id="rId17"/>
+    <p:sldId id="395" r:id="rId18"/>
+    <p:sldId id="396" r:id="rId19"/>
+    <p:sldId id="378" r:id="rId20"/>
+    <p:sldId id="385" r:id="rId21"/>
+    <p:sldId id="386" r:id="rId22"/>
+    <p:sldId id="384" r:id="rId23"/>
+    <p:sldId id="383" r:id="rId24"/>
+    <p:sldId id="380" r:id="rId25"/>
+    <p:sldId id="387" r:id="rId26"/>
+    <p:sldId id="388" r:id="rId27"/>
+    <p:sldId id="391" r:id="rId28"/>
+    <p:sldId id="389" r:id="rId29"/>
+    <p:sldId id="390" r:id="rId30"/>
+    <p:sldId id="392" r:id="rId31"/>
+    <p:sldId id="393" r:id="rId32"/>
+    <p:sldId id="381" r:id="rId33"/>
+    <p:sldId id="394" r:id="rId34"/>
+    <p:sldId id="362" r:id="rId35"/>
+    <p:sldId id="346" r:id="rId36"/>
   </p:sldIdLst>
   <p:sldSz cx="12192000" cy="6858000"/>
   <p:notesSz cx="6985000" cy="9283700"/>
   <p:custDataLst>
-    <p:tags r:id="rId40"/>
+    <p:tags r:id="rId39"/>
   </p:custDataLst>
   <p:defaultTextStyle>
     <a:defPPr>
@@ -938,6 +937,91 @@
     <p:extLst>
       <p:ext uri="{BB962C8B-B14F-4D97-AF65-F5344CB8AC3E}">
         <p14:creationId xmlns:p14="http://schemas.microsoft.com/office/powerpoint/2010/main" val="487200002"/>
+      </p:ext>
+    </p:extLst>
+  </p:cSld>
+  <p:clrMapOvr>
+    <a:masterClrMapping/>
+  </p:clrMapOvr>
+</p:notes>
+</file>
+
+<file path=ppt/notesSlides/notesSlide3.xml><?xml version="1.0" encoding="utf-8"?>
+<p:notes xmlns:a="http://schemas.openxmlformats.org/drawingml/2006/main" xmlns:r="http://schemas.openxmlformats.org/officeDocument/2006/relationships" xmlns:p="http://schemas.openxmlformats.org/presentationml/2006/main">
+  <p:cSld>
+    <p:spTree>
+      <p:nvGrpSpPr>
+        <p:cNvPr id="1" name=""/>
+        <p:cNvGrpSpPr/>
+        <p:nvPr/>
+      </p:nvGrpSpPr>
+      <p:grpSpPr>
+        <a:xfrm>
+          <a:off x="0" y="0"/>
+          <a:ext cx="0" cy="0"/>
+          <a:chOff x="0" y="0"/>
+          <a:chExt cx="0" cy="0"/>
+        </a:xfrm>
+      </p:grpSpPr>
+      <p:sp>
+        <p:nvSpPr>
+          <p:cNvPr id="2" name="Plassholder for lysbilde 1"/>
+          <p:cNvSpPr>
+            <a:spLocks noGrp="1" noRot="1" noChangeAspect="1"/>
+          </p:cNvSpPr>
+          <p:nvPr>
+            <p:ph type="sldImg"/>
+          </p:nvPr>
+        </p:nvSpPr>
+        <p:spPr/>
+      </p:sp>
+      <p:sp>
+        <p:nvSpPr>
+          <p:cNvPr id="3" name="Plassholder for notater 2"/>
+          <p:cNvSpPr>
+            <a:spLocks noGrp="1"/>
+          </p:cNvSpPr>
+          <p:nvPr>
+            <p:ph type="body" idx="1"/>
+          </p:nvPr>
+        </p:nvSpPr>
+        <p:spPr/>
+        <p:txBody>
+          <a:bodyPr/>
+          <a:lstStyle/>
+          <a:p>
+            <a:endParaRPr lang="nb-NO" dirty="0"/>
+          </a:p>
+        </p:txBody>
+      </p:sp>
+      <p:sp>
+        <p:nvSpPr>
+          <p:cNvPr id="4" name="Plassholder for lysbildenummer 3"/>
+          <p:cNvSpPr>
+            <a:spLocks noGrp="1"/>
+          </p:cNvSpPr>
+          <p:nvPr>
+            <p:ph type="sldNum" sz="quarter" idx="10"/>
+          </p:nvPr>
+        </p:nvSpPr>
+        <p:spPr/>
+        <p:txBody>
+          <a:bodyPr/>
+          <a:lstStyle/>
+          <a:p>
+            <a:fld id="{DF028019-AA91-4C76-BB6B-CB38C01EC32F}" type="slidenum">
+              <a:rPr lang="en-GB" smtClean="0"/>
+              <a:pPr/>
+              <a:t>6</a:t>
+            </a:fld>
+            <a:endParaRPr lang="en-GB"/>
+          </a:p>
+        </p:txBody>
+      </p:sp>
+    </p:spTree>
+    <p:extLst>
+      <p:ext uri="{BB962C8B-B14F-4D97-AF65-F5344CB8AC3E}">
+        <p14:creationId xmlns:p14="http://schemas.microsoft.com/office/powerpoint/2010/main" val="2450812517"/>
       </p:ext>
     </p:extLst>
   </p:cSld>
@@ -8646,7 +8730,13 @@
       </p:grpSpPr>
       <p:sp>
         <p:nvSpPr>
-          <p:cNvPr id="7" name="Title 6"/>
+          <p:cNvPr id="2" name="Tittel 1">
+            <a:extLst>
+              <a:ext uri="{FF2B5EF4-FFF2-40B4-BE49-F238E27FC236}">
+                <a16:creationId xmlns:a16="http://schemas.microsoft.com/office/drawing/2014/main" id="{F1A07B79-50BD-034E-B9C5-89BCA11EA5D5}"/>
+              </a:ext>
+            </a:extLst>
+          </p:cNvPr>
           <p:cNvSpPr>
             <a:spLocks noGrp="1"/>
           </p:cNvSpPr>
@@ -8660,16 +8750,21 @@
           <a:lstStyle/>
           <a:p>
             <a:r>
-              <a:rPr lang="sv-SE" dirty="0" err="1"/>
+              <a:rPr lang="en-US" dirty="0"/>
               <a:t>React</a:t>
             </a:r>
-            <a:endParaRPr lang="sv-SE" dirty="0"/>
-          </a:p>
-        </p:txBody>
-      </p:sp>
-      <p:sp>
-        <p:nvSpPr>
-          <p:cNvPr id="6" name="Slide Number Placeholder 5"/>
+          </a:p>
+        </p:txBody>
+      </p:sp>
+      <p:sp>
+        <p:nvSpPr>
+          <p:cNvPr id="5" name="Plassholder for lysbildenummer 4">
+            <a:extLst>
+              <a:ext uri="{FF2B5EF4-FFF2-40B4-BE49-F238E27FC236}">
+                <a16:creationId xmlns:a16="http://schemas.microsoft.com/office/drawing/2014/main" id="{F8F2F675-7B03-A145-8E92-CA39DFFEC22D}"/>
+              </a:ext>
+            </a:extLst>
+          </p:cNvPr>
           <p:cNvSpPr>
             <a:spLocks noGrp="1"/>
           </p:cNvSpPr>
@@ -8683,17 +8778,22 @@
           <a:lstStyle/>
           <a:p>
             <a:fld id="{A92D7E8A-A0E3-4239-9A38-4F8DCAE2A924}" type="slidenum">
-              <a:rPr lang="sv-SE" smtClean="0"/>
-              <a:pPr/>
+              <a:rPr lang="en-GB" smtClean="0"/>
               <a:t>10</a:t>
             </a:fld>
-            <a:endParaRPr lang="sv-SE"/>
-          </a:p>
-        </p:txBody>
-      </p:sp>
-      <p:sp>
-        <p:nvSpPr>
-          <p:cNvPr id="8" name="Content Placeholder 7"/>
+            <a:endParaRPr lang="en-GB"/>
+          </a:p>
+        </p:txBody>
+      </p:sp>
+      <p:sp>
+        <p:nvSpPr>
+          <p:cNvPr id="6" name="Plassholder for innhold 5">
+            <a:extLst>
+              <a:ext uri="{FF2B5EF4-FFF2-40B4-BE49-F238E27FC236}">
+                <a16:creationId xmlns:a16="http://schemas.microsoft.com/office/drawing/2014/main" id="{E03EBC58-87AC-1242-99B9-9D9B5893FE79}"/>
+              </a:ext>
+            </a:extLst>
+          </p:cNvPr>
           <p:cNvSpPr>
             <a:spLocks noGrp="1"/>
           </p:cNvSpPr>
@@ -8706,56 +8806,17 @@
           <a:bodyPr/>
           <a:lstStyle/>
           <a:p>
-            <a:r>
-              <a:rPr lang="en-GB" dirty="0"/>
-              <a:t>##	Framework made to make web development easier</a:t>
-            </a:r>
-          </a:p>
-          <a:p>
-            <a:r>
-              <a:rPr lang="en-GB" dirty="0"/>
-              <a:t>##	Easier to use compared to other frameworks due the architecture of the framework</a:t>
-            </a:r>
-          </a:p>
-          <a:p>
-            <a:r>
-              <a:rPr lang="en-GB" dirty="0"/>
-              <a:t>##	Logic for code and separation of concern is made through “Components”</a:t>
-            </a:r>
-          </a:p>
-          <a:p>
-            <a:r>
-              <a:rPr lang="en-GB" dirty="0"/>
-              <a:t>##	Components encapsulates state and logic, which has a relationship like a Binary Search 	Tree</a:t>
-            </a:r>
-          </a:p>
-          <a:p>
-            <a:r>
-              <a:rPr lang="en-GB" dirty="0"/>
-              <a:t>##	Parent nodes can send data down to child nodes and child nodes can invoke actions to 	parent nodes</a:t>
-            </a:r>
-          </a:p>
-          <a:p>
-            <a:r>
-              <a:rPr lang="en-GB" dirty="0"/>
-              <a:t>## 	Functionality split into cycles that a component lives through</a:t>
-            </a:r>
-          </a:p>
-          <a:p>
             <a:endParaRPr lang="en-GB" dirty="0"/>
           </a:p>
           <a:p>
-            <a:endParaRPr lang="en-GB" dirty="0"/>
-          </a:p>
-          <a:p>
-            <a:endParaRPr lang="en-GB" dirty="0"/>
+            <a:endParaRPr lang="en-US" dirty="0"/>
           </a:p>
         </p:txBody>
       </p:sp>
     </p:spTree>
     <p:extLst>
       <p:ext uri="{BB962C8B-B14F-4D97-AF65-F5344CB8AC3E}">
-        <p14:creationId xmlns:p14="http://schemas.microsoft.com/office/powerpoint/2010/main" val="4122675122"/>
+        <p14:creationId xmlns:p14="http://schemas.microsoft.com/office/powerpoint/2010/main" val="3223354025"/>
       </p:ext>
     </p:extLst>
   </p:cSld>
@@ -8790,7 +8851,7 @@
           <p:cNvPr id="2" name="Tittel 1">
             <a:extLst>
               <a:ext uri="{FF2B5EF4-FFF2-40B4-BE49-F238E27FC236}">
-                <a16:creationId xmlns:a16="http://schemas.microsoft.com/office/drawing/2014/main" id="{F1A07B79-50BD-034E-B9C5-89BCA11EA5D5}"/>
+                <a16:creationId xmlns:a16="http://schemas.microsoft.com/office/drawing/2014/main" id="{AD3DB98A-1EC3-B344-8ECC-0D3229E989B3}"/>
               </a:ext>
             </a:extLst>
           </p:cNvPr>
@@ -8801,14 +8862,20 @@
             <p:ph type="title"/>
           </p:nvPr>
         </p:nvSpPr>
-        <p:spPr/>
+        <p:spPr>
+          <a:xfrm>
+            <a:off x="539999" y="2349500"/>
+            <a:ext cx="11112251" cy="1079500"/>
+          </a:xfrm>
+        </p:spPr>
         <p:txBody>
           <a:bodyPr/>
           <a:lstStyle/>
           <a:p>
+            <a:pPr algn="ctr"/>
             <a:r>
               <a:rPr lang="en-US" dirty="0"/>
-              <a:t>JSX</a:t>
+              <a:t>Simple Hello World</a:t>
             </a:r>
           </a:p>
         </p:txBody>
@@ -8818,7 +8885,7 @@
           <p:cNvPr id="5" name="Plassholder for lysbildenummer 4">
             <a:extLst>
               <a:ext uri="{FF2B5EF4-FFF2-40B4-BE49-F238E27FC236}">
-                <a16:creationId xmlns:a16="http://schemas.microsoft.com/office/drawing/2014/main" id="{F8F2F675-7B03-A145-8E92-CA39DFFEC22D}"/>
+                <a16:creationId xmlns:a16="http://schemas.microsoft.com/office/drawing/2014/main" id="{A1BC0CF0-5812-B940-9FB7-C798EB385B71}"/>
               </a:ext>
             </a:extLst>
           </p:cNvPr>
@@ -8844,39 +8911,47 @@
       </p:sp>
       <p:sp>
         <p:nvSpPr>
-          <p:cNvPr id="6" name="Plassholder for innhold 5">
+          <p:cNvPr id="3" name="TekstSylinder 2">
             <a:extLst>
               <a:ext uri="{FF2B5EF4-FFF2-40B4-BE49-F238E27FC236}">
-                <a16:creationId xmlns:a16="http://schemas.microsoft.com/office/drawing/2014/main" id="{E03EBC58-87AC-1242-99B9-9D9B5893FE79}"/>
+                <a16:creationId xmlns:a16="http://schemas.microsoft.com/office/drawing/2014/main" id="{067E74A4-84FE-4C89-A62B-8779309F893F}"/>
               </a:ext>
             </a:extLst>
           </p:cNvPr>
-          <p:cNvSpPr>
-            <a:spLocks noGrp="1"/>
-          </p:cNvSpPr>
-          <p:nvPr>
-            <p:ph sz="quarter" idx="13"/>
-          </p:nvPr>
-        </p:nvSpPr>
-        <p:spPr/>
-        <p:txBody>
-          <a:bodyPr/>
+          <p:cNvSpPr txBox="1"/>
+          <p:nvPr/>
+        </p:nvSpPr>
+        <p:spPr>
+          <a:xfrm>
+            <a:off x="1" y="4048217"/>
+            <a:ext cx="12192000" cy="830997"/>
+          </a:xfrm>
+          <a:prstGeom prst="rect">
+            <a:avLst/>
+          </a:prstGeom>
+          <a:noFill/>
+        </p:spPr>
+        <p:txBody>
+          <a:bodyPr wrap="square" lIns="0" tIns="0" rIns="0" bIns="0" rtlCol="0">
+            <a:spAutoFit/>
+          </a:bodyPr>
           <a:lstStyle/>
           <a:p>
-            <a:r>
-              <a:rPr lang="en-GB" dirty="0"/>
-              <a:t>##	HTML-alike syntax</a:t>
-            </a:r>
-          </a:p>
-          <a:p>
-            <a:endParaRPr lang="en-US" dirty="0"/>
+            <a:pPr algn="ctr"/>
+            <a:r>
+              <a:rPr lang="nb-NO" sz="5400" dirty="0">
+                <a:hlinkClick r:id="rId2"/>
+              </a:rPr>
+              <a:t>https://codesandbox.io/s/4056qq13z4</a:t>
+            </a:r>
+            <a:endParaRPr lang="nb-NO" sz="5400" dirty="0"/>
           </a:p>
         </p:txBody>
       </p:sp>
     </p:spTree>
     <p:extLst>
       <p:ext uri="{BB962C8B-B14F-4D97-AF65-F5344CB8AC3E}">
-        <p14:creationId xmlns:p14="http://schemas.microsoft.com/office/powerpoint/2010/main" val="3223354025"/>
+        <p14:creationId xmlns:p14="http://schemas.microsoft.com/office/powerpoint/2010/main" val="2103039048"/>
       </p:ext>
     </p:extLst>
   </p:cSld>
@@ -8911,7 +8986,7 @@
           <p:cNvPr id="2" name="Tittel 1">
             <a:extLst>
               <a:ext uri="{FF2B5EF4-FFF2-40B4-BE49-F238E27FC236}">
-                <a16:creationId xmlns:a16="http://schemas.microsoft.com/office/drawing/2014/main" id="{AD3DB98A-1EC3-B344-8ECC-0D3229E989B3}"/>
+                <a16:creationId xmlns:a16="http://schemas.microsoft.com/office/drawing/2014/main" id="{03238D55-E134-E74F-98FC-326D3C760CDA}"/>
               </a:ext>
             </a:extLst>
           </p:cNvPr>
@@ -8922,20 +8997,14 @@
             <p:ph type="title"/>
           </p:nvPr>
         </p:nvSpPr>
-        <p:spPr>
-          <a:xfrm>
-            <a:off x="539999" y="2349500"/>
-            <a:ext cx="11112251" cy="1079500"/>
-          </a:xfrm>
-        </p:spPr>
+        <p:spPr/>
         <p:txBody>
           <a:bodyPr/>
           <a:lstStyle/>
           <a:p>
-            <a:pPr algn="ctr"/>
             <a:r>
               <a:rPr lang="en-US" dirty="0"/>
-              <a:t>Simple Hello World</a:t>
+              <a:t>React Concepts</a:t>
             </a:r>
           </a:p>
         </p:txBody>
@@ -8945,7 +9014,7 @@
           <p:cNvPr id="5" name="Plassholder for lysbildenummer 4">
             <a:extLst>
               <a:ext uri="{FF2B5EF4-FFF2-40B4-BE49-F238E27FC236}">
-                <a16:creationId xmlns:a16="http://schemas.microsoft.com/office/drawing/2014/main" id="{A1BC0CF0-5812-B940-9FB7-C798EB385B71}"/>
+                <a16:creationId xmlns:a16="http://schemas.microsoft.com/office/drawing/2014/main" id="{3CE6C83A-6B1F-6C40-B634-C61A3549A43D}"/>
               </a:ext>
             </a:extLst>
           </p:cNvPr>
@@ -8969,10 +9038,86 @@
           </a:p>
         </p:txBody>
       </p:sp>
+      <p:sp>
+        <p:nvSpPr>
+          <p:cNvPr id="6" name="Plassholder for innhold 5">
+            <a:extLst>
+              <a:ext uri="{FF2B5EF4-FFF2-40B4-BE49-F238E27FC236}">
+                <a16:creationId xmlns:a16="http://schemas.microsoft.com/office/drawing/2014/main" id="{9D4529FE-8117-5642-BF22-912071011B4D}"/>
+              </a:ext>
+            </a:extLst>
+          </p:cNvPr>
+          <p:cNvSpPr>
+            <a:spLocks noGrp="1"/>
+          </p:cNvSpPr>
+          <p:nvPr>
+            <p:ph sz="quarter" idx="13"/>
+          </p:nvPr>
+        </p:nvSpPr>
+        <p:spPr/>
+        <p:txBody>
+          <a:bodyPr/>
+          <a:lstStyle/>
+          <a:p>
+            <a:pPr fontAlgn="base"/>
+            <a:r>
+              <a:rPr lang="en-GB" dirty="0"/>
+              <a:t>##</a:t>
+            </a:r>
+            <a:r>
+              <a:rPr lang="en" dirty="0"/>
+              <a:t> Virtual DOM </a:t>
+            </a:r>
+          </a:p>
+          <a:p>
+            <a:pPr fontAlgn="base"/>
+            <a:r>
+              <a:rPr lang="en" dirty="0"/>
+              <a:t>## Component and Component Architecture  </a:t>
+            </a:r>
+          </a:p>
+          <a:p>
+            <a:pPr fontAlgn="base"/>
+            <a:r>
+              <a:rPr lang="en" dirty="0"/>
+              <a:t>## props and state (read-only, r/w data)</a:t>
+            </a:r>
+          </a:p>
+          <a:p>
+            <a:pPr fontAlgn="base"/>
+            <a:r>
+              <a:rPr lang="en" dirty="0"/>
+              <a:t>## event handling and responding to events (click, drag, </a:t>
+            </a:r>
+            <a:r>
+              <a:rPr lang="en" dirty="0" err="1"/>
+              <a:t>etc</a:t>
+            </a:r>
+            <a:r>
+              <a:rPr lang="en" dirty="0"/>
+              <a:t>)</a:t>
+            </a:r>
+          </a:p>
+          <a:p>
+            <a:pPr fontAlgn="base"/>
+            <a:r>
+              <a:rPr lang="en" dirty="0"/>
+              <a:t>## Component life cycle  </a:t>
+            </a:r>
+          </a:p>
+          <a:p>
+            <a:pPr fontAlgn="base"/>
+            <a:r>
+              <a:rPr lang="en" dirty="0"/>
+              <a:t>## Ajax requests  and fetching data</a:t>
+            </a:r>
+          </a:p>
+        </p:txBody>
+      </p:sp>
     </p:spTree>
     <p:extLst>
       <p:ext uri="{BB962C8B-B14F-4D97-AF65-F5344CB8AC3E}">
-        <p14:creationId xmlns:p14="http://schemas.microsoft.com/office/powerpoint/2010/main" val="2103039048"/>
+        <p14:creationId xmlns:p14="http://schemas.microsoft.com/office/powerpoint/2010/main" val="956830461"/>
       </p:ext>
     </p:extLst>
   </p:cSld>
@@ -9018,15 +9163,22 @@
             <p:ph type="title"/>
           </p:nvPr>
         </p:nvSpPr>
-        <p:spPr/>
+        <p:spPr>
+          <a:xfrm>
+            <a:off x="539874" y="2889250"/>
+            <a:ext cx="11112251" cy="1079500"/>
+          </a:xfrm>
+        </p:spPr>
         <p:txBody>
           <a:bodyPr/>
           <a:lstStyle/>
           <a:p>
-            <a:r>
-              <a:rPr lang="en-US" dirty="0"/>
-              <a:t>React Concepts</a:t>
-            </a:r>
+            <a:pPr algn="ctr" fontAlgn="base"/>
+            <a:r>
+              <a:rPr lang="en" dirty="0"/>
+              <a:t>Virtual DOM</a:t>
+            </a:r>
+            <a:endParaRPr lang="en-GB" dirty="0"/>
           </a:p>
         </p:txBody>
       </p:sp>
@@ -9061,84 +9213,119 @@
       </p:sp>
       <p:sp>
         <p:nvSpPr>
-          <p:cNvPr id="6" name="Plassholder for innhold 5">
+          <p:cNvPr id="7" name="TekstSylinder 6">
             <a:extLst>
               <a:ext uri="{FF2B5EF4-FFF2-40B4-BE49-F238E27FC236}">
-                <a16:creationId xmlns:a16="http://schemas.microsoft.com/office/drawing/2014/main" id="{9D4529FE-8117-5642-BF22-912071011B4D}"/>
+                <a16:creationId xmlns:a16="http://schemas.microsoft.com/office/drawing/2014/main" id="{AECF818A-9636-4340-AC7C-194689DF39E4}"/>
               </a:ext>
             </a:extLst>
           </p:cNvPr>
-          <p:cNvSpPr>
-            <a:spLocks noGrp="1"/>
-          </p:cNvSpPr>
-          <p:nvPr>
-            <p:ph sz="quarter" idx="13"/>
-          </p:nvPr>
-        </p:nvSpPr>
-        <p:spPr/>
-        <p:txBody>
-          <a:bodyPr/>
+          <p:cNvSpPr txBox="1"/>
+          <p:nvPr/>
+        </p:nvSpPr>
+        <p:spPr>
+          <a:xfrm>
+            <a:off x="2275489" y="3968750"/>
+            <a:ext cx="7641020" cy="276999"/>
+          </a:xfrm>
+          <a:prstGeom prst="rect">
+            <a:avLst/>
+          </a:prstGeom>
+          <a:noFill/>
+        </p:spPr>
+        <p:txBody>
+          <a:bodyPr wrap="square" lIns="0" tIns="0" rIns="0" bIns="0" rtlCol="0">
+            <a:spAutoFit/>
+          </a:bodyPr>
           <a:lstStyle/>
           <a:p>
-            <a:pPr fontAlgn="base"/>
-            <a:r>
-              <a:rPr lang="en-GB" dirty="0"/>
-              <a:t>##</a:t>
+            <a:pPr marL="285750" indent="-285750" algn="ctr">
+              <a:buFont typeface="Arial" panose="020B0604020202020204" pitchFamily="34" charset="0"/>
+              <a:buChar char="•"/>
+            </a:pPr>
+            <a:r>
+              <a:rPr lang="nb-NO" dirty="0" err="1"/>
+              <a:t>Isomorphic</a:t>
             </a:r>
             <a:r>
               <a:rPr lang="en" dirty="0"/>
-              <a:t> Virtual DOM </a:t>
-            </a:r>
-          </a:p>
-          <a:p>
-            <a:pPr fontAlgn="base"/>
-            <a:r>
-              <a:rPr lang="en" dirty="0"/>
-              <a:t>## Component and Component Architecture  </a:t>
-            </a:r>
-          </a:p>
-          <a:p>
-            <a:pPr fontAlgn="base"/>
-            <a:r>
-              <a:rPr lang="en" dirty="0"/>
-              <a:t>## props and state (read-only, r/w data)</a:t>
-            </a:r>
-          </a:p>
-          <a:p>
-            <a:pPr fontAlgn="base"/>
-            <a:r>
-              <a:rPr lang="en" dirty="0"/>
-              <a:t>## event handling and responding to events (click, drag, </a:t>
-            </a:r>
-            <a:r>
-              <a:rPr lang="en" dirty="0" err="1"/>
-              <a:t>etc</a:t>
-            </a:r>
-            <a:r>
-              <a:rPr lang="en" dirty="0"/>
-              <a:t>)</a:t>
-            </a:r>
-          </a:p>
-          <a:p>
-            <a:pPr fontAlgn="base"/>
-            <a:r>
-              <a:rPr lang="en" dirty="0"/>
-              <a:t>## Component life cycle  </a:t>
-            </a:r>
-          </a:p>
-          <a:p>
-            <a:pPr fontAlgn="base"/>
-            <a:r>
-              <a:rPr lang="en" dirty="0"/>
-              <a:t>## Ajax requests  and fetching data</a:t>
-            </a:r>
+              <a:t> Data Structure</a:t>
+            </a:r>
+            <a:endParaRPr lang="en-US" dirty="0" err="1"/>
+          </a:p>
+        </p:txBody>
+      </p:sp>
+      <p:sp>
+        <p:nvSpPr>
+          <p:cNvPr id="8" name="Rektangel 7">
+            <a:extLst>
+              <a:ext uri="{FF2B5EF4-FFF2-40B4-BE49-F238E27FC236}">
+                <a16:creationId xmlns:a16="http://schemas.microsoft.com/office/drawing/2014/main" id="{5906A5AA-6344-274D-9E89-2F51F63164B7}"/>
+              </a:ext>
+            </a:extLst>
+          </p:cNvPr>
+          <p:cNvSpPr/>
+          <p:nvPr/>
+        </p:nvSpPr>
+        <p:spPr>
+          <a:xfrm>
+            <a:off x="3047998" y="6098753"/>
+            <a:ext cx="7073463" cy="369332"/>
+          </a:xfrm>
+          <a:prstGeom prst="rect">
+            <a:avLst/>
+          </a:prstGeom>
+        </p:spPr>
+        <p:txBody>
+          <a:bodyPr wrap="square">
+            <a:spAutoFit/>
+          </a:bodyPr>
+          <a:lstStyle/>
+          <a:p>
+            <a:r>
+              <a:rPr lang="en-US" dirty="0">
+                <a:solidFill>
+                  <a:srgbClr val="002060"/>
+                </a:solidFill>
+              </a:rPr>
+              <a:t>https://</a:t>
+            </a:r>
+            <a:r>
+              <a:rPr lang="en-US" dirty="0" err="1">
+                <a:solidFill>
+                  <a:srgbClr val="002060"/>
+                </a:solidFill>
+              </a:rPr>
+              <a:t>reactjs.org</a:t>
+            </a:r>
+            <a:r>
+              <a:rPr lang="en-US" dirty="0">
+                <a:solidFill>
+                  <a:srgbClr val="002060"/>
+                </a:solidFill>
+              </a:rPr>
+              <a:t>/docs/</a:t>
+            </a:r>
+            <a:r>
+              <a:rPr lang="en-US" dirty="0" err="1">
+                <a:solidFill>
+                  <a:srgbClr val="002060"/>
+                </a:solidFill>
+              </a:rPr>
+              <a:t>faq-internals.html#what-is-the-virtual-dom</a:t>
+            </a:r>
+            <a:endParaRPr lang="en-US" dirty="0">
+              <a:solidFill>
+                <a:srgbClr val="002060"/>
+              </a:solidFill>
+            </a:endParaRPr>
           </a:p>
         </p:txBody>
       </p:sp>
     </p:spTree>
     <p:extLst>
       <p:ext uri="{BB962C8B-B14F-4D97-AF65-F5344CB8AC3E}">
-        <p14:creationId xmlns:p14="http://schemas.microsoft.com/office/powerpoint/2010/main" val="956830461"/>
+        <p14:creationId xmlns:p14="http://schemas.microsoft.com/office/powerpoint/2010/main" val="915069032"/>
       </p:ext>
     </p:extLst>
   </p:cSld>
@@ -9170,41 +9357,6 @@
       </p:grpSpPr>
       <p:sp>
         <p:nvSpPr>
-          <p:cNvPr id="2" name="Tittel 1">
-            <a:extLst>
-              <a:ext uri="{FF2B5EF4-FFF2-40B4-BE49-F238E27FC236}">
-                <a16:creationId xmlns:a16="http://schemas.microsoft.com/office/drawing/2014/main" id="{03238D55-E134-E74F-98FC-326D3C760CDA}"/>
-              </a:ext>
-            </a:extLst>
-          </p:cNvPr>
-          <p:cNvSpPr>
-            <a:spLocks noGrp="1"/>
-          </p:cNvSpPr>
-          <p:nvPr>
-            <p:ph type="title"/>
-          </p:nvPr>
-        </p:nvSpPr>
-        <p:spPr>
-          <a:xfrm>
-            <a:off x="539874" y="2889250"/>
-            <a:ext cx="11112251" cy="1079500"/>
-          </a:xfrm>
-        </p:spPr>
-        <p:txBody>
-          <a:bodyPr/>
-          <a:lstStyle/>
-          <a:p>
-            <a:pPr algn="ctr" fontAlgn="base"/>
-            <a:r>
-              <a:rPr lang="en" dirty="0"/>
-              <a:t>Virtual DOM</a:t>
-            </a:r>
-            <a:endParaRPr lang="en-GB" dirty="0"/>
-          </a:p>
-        </p:txBody>
-      </p:sp>
-      <p:sp>
-        <p:nvSpPr>
           <p:cNvPr id="5" name="Plassholder for lysbildenummer 4">
             <a:extLst>
               <a:ext uri="{FF2B5EF4-FFF2-40B4-BE49-F238E27FC236}">
@@ -9227,179 +9379,6 @@
             <a:fld id="{A92D7E8A-A0E3-4239-9A38-4F8DCAE2A924}" type="slidenum">
               <a:rPr lang="en-GB" smtClean="0"/>
               <a:t>14</a:t>
-            </a:fld>
-            <a:endParaRPr lang="en-GB"/>
-          </a:p>
-        </p:txBody>
-      </p:sp>
-      <p:sp>
-        <p:nvSpPr>
-          <p:cNvPr id="7" name="TekstSylinder 6">
-            <a:extLst>
-              <a:ext uri="{FF2B5EF4-FFF2-40B4-BE49-F238E27FC236}">
-                <a16:creationId xmlns:a16="http://schemas.microsoft.com/office/drawing/2014/main" id="{AECF818A-9636-4340-AC7C-194689DF39E4}"/>
-              </a:ext>
-            </a:extLst>
-          </p:cNvPr>
-          <p:cNvSpPr txBox="1"/>
-          <p:nvPr/>
-        </p:nvSpPr>
-        <p:spPr>
-          <a:xfrm>
-            <a:off x="2275489" y="3968750"/>
-            <a:ext cx="7641020" cy="276999"/>
-          </a:xfrm>
-          <a:prstGeom prst="rect">
-            <a:avLst/>
-          </a:prstGeom>
-          <a:noFill/>
-        </p:spPr>
-        <p:txBody>
-          <a:bodyPr wrap="square" lIns="0" tIns="0" rIns="0" bIns="0" rtlCol="0">
-            <a:spAutoFit/>
-          </a:bodyPr>
-          <a:lstStyle/>
-          <a:p>
-            <a:pPr marL="285750" indent="-285750" algn="ctr">
-              <a:buFont typeface="Arial" panose="020B0604020202020204" pitchFamily="34" charset="0"/>
-              <a:buChar char="•"/>
-            </a:pPr>
-            <a:r>
-              <a:rPr lang="nb-NO" dirty="0" err="1"/>
-              <a:t>Isomorphic</a:t>
-            </a:r>
-            <a:r>
-              <a:rPr lang="en" dirty="0"/>
-              <a:t> Data Structure</a:t>
-            </a:r>
-            <a:endParaRPr lang="en-US" dirty="0" err="1"/>
-          </a:p>
-        </p:txBody>
-      </p:sp>
-      <p:sp>
-        <p:nvSpPr>
-          <p:cNvPr id="8" name="Rektangel 7">
-            <a:extLst>
-              <a:ext uri="{FF2B5EF4-FFF2-40B4-BE49-F238E27FC236}">
-                <a16:creationId xmlns:a16="http://schemas.microsoft.com/office/drawing/2014/main" id="{5906A5AA-6344-274D-9E89-2F51F63164B7}"/>
-              </a:ext>
-            </a:extLst>
-          </p:cNvPr>
-          <p:cNvSpPr/>
-          <p:nvPr/>
-        </p:nvSpPr>
-        <p:spPr>
-          <a:xfrm>
-            <a:off x="3047998" y="6098753"/>
-            <a:ext cx="7073463" cy="369332"/>
-          </a:xfrm>
-          <a:prstGeom prst="rect">
-            <a:avLst/>
-          </a:prstGeom>
-        </p:spPr>
-        <p:txBody>
-          <a:bodyPr wrap="square">
-            <a:spAutoFit/>
-          </a:bodyPr>
-          <a:lstStyle/>
-          <a:p>
-            <a:r>
-              <a:rPr lang="en-US" dirty="0">
-                <a:solidFill>
-                  <a:srgbClr val="002060"/>
-                </a:solidFill>
-              </a:rPr>
-              <a:t>https://</a:t>
-            </a:r>
-            <a:r>
-              <a:rPr lang="en-US" dirty="0" err="1">
-                <a:solidFill>
-                  <a:srgbClr val="002060"/>
-                </a:solidFill>
-              </a:rPr>
-              <a:t>reactjs.org</a:t>
-            </a:r>
-            <a:r>
-              <a:rPr lang="en-US" dirty="0">
-                <a:solidFill>
-                  <a:srgbClr val="002060"/>
-                </a:solidFill>
-              </a:rPr>
-              <a:t>/docs/</a:t>
-            </a:r>
-            <a:r>
-              <a:rPr lang="en-US" dirty="0" err="1">
-                <a:solidFill>
-                  <a:srgbClr val="002060"/>
-                </a:solidFill>
-              </a:rPr>
-              <a:t>faq-internals.html#what-is-the-virtual-dom</a:t>
-            </a:r>
-            <a:endParaRPr lang="en-US" dirty="0">
-              <a:solidFill>
-                <a:srgbClr val="002060"/>
-              </a:solidFill>
-            </a:endParaRPr>
-          </a:p>
-        </p:txBody>
-      </p:sp>
-    </p:spTree>
-    <p:extLst>
-      <p:ext uri="{BB962C8B-B14F-4D97-AF65-F5344CB8AC3E}">
-        <p14:creationId xmlns:p14="http://schemas.microsoft.com/office/powerpoint/2010/main" val="915069032"/>
-      </p:ext>
-    </p:extLst>
-  </p:cSld>
-  <p:clrMapOvr>
-    <a:masterClrMapping/>
-  </p:clrMapOvr>
-  <p:transition>
-    <p:fade/>
-  </p:transition>
-</p:sld>
-</file>
-
-<file path=ppt/slides/slide15.xml><?xml version="1.0" encoding="utf-8"?>
-<p:sld xmlns:a="http://schemas.openxmlformats.org/drawingml/2006/main" xmlns:r="http://schemas.openxmlformats.org/officeDocument/2006/relationships" xmlns:p="http://schemas.openxmlformats.org/presentationml/2006/main">
-  <p:cSld>
-    <p:spTree>
-      <p:nvGrpSpPr>
-        <p:cNvPr id="1" name=""/>
-        <p:cNvGrpSpPr/>
-        <p:nvPr/>
-      </p:nvGrpSpPr>
-      <p:grpSpPr>
-        <a:xfrm>
-          <a:off x="0" y="0"/>
-          <a:ext cx="0" cy="0"/>
-          <a:chOff x="0" y="0"/>
-          <a:chExt cx="0" cy="0"/>
-        </a:xfrm>
-      </p:grpSpPr>
-      <p:sp>
-        <p:nvSpPr>
-          <p:cNvPr id="5" name="Plassholder for lysbildenummer 4">
-            <a:extLst>
-              <a:ext uri="{FF2B5EF4-FFF2-40B4-BE49-F238E27FC236}">
-                <a16:creationId xmlns:a16="http://schemas.microsoft.com/office/drawing/2014/main" id="{3CE6C83A-6B1F-6C40-B634-C61A3549A43D}"/>
-              </a:ext>
-            </a:extLst>
-          </p:cNvPr>
-          <p:cNvSpPr>
-            <a:spLocks noGrp="1"/>
-          </p:cNvSpPr>
-          <p:nvPr>
-            <p:ph type="sldNum" sz="quarter" idx="12"/>
-          </p:nvPr>
-        </p:nvSpPr>
-        <p:spPr/>
-        <p:txBody>
-          <a:bodyPr/>
-          <a:lstStyle/>
-          <a:p>
-            <a:fld id="{A92D7E8A-A0E3-4239-9A38-4F8DCAE2A924}" type="slidenum">
-              <a:rPr lang="en-GB" smtClean="0"/>
-              <a:t>15</a:t>
             </a:fld>
             <a:endParaRPr lang="en-GB"/>
           </a:p>
@@ -9451,7 +9430,7 @@
 </p:sld>
 </file>
 
-<file path=ppt/slides/slide16.xml><?xml version="1.0" encoding="utf-8"?>
+<file path=ppt/slides/slide15.xml><?xml version="1.0" encoding="utf-8"?>
 <p:sld xmlns:a="http://schemas.openxmlformats.org/drawingml/2006/main" xmlns:r="http://schemas.openxmlformats.org/officeDocument/2006/relationships" xmlns:p="http://schemas.openxmlformats.org/presentationml/2006/main">
   <p:cSld>
     <p:spTree>
@@ -9491,7 +9470,7 @@
           <a:p>
             <a:fld id="{A92D7E8A-A0E3-4239-9A38-4F8DCAE2A924}" type="slidenum">
               <a:rPr lang="en-GB" smtClean="0"/>
-              <a:t>16</a:t>
+              <a:t>15</a:t>
             </a:fld>
             <a:endParaRPr lang="en-GB"/>
           </a:p>
@@ -9543,6 +9522,142 @@
 </p:sld>
 </file>
 
+<file path=ppt/slides/slide16.xml><?xml version="1.0" encoding="utf-8"?>
+<p:sld xmlns:a="http://schemas.openxmlformats.org/drawingml/2006/main" xmlns:r="http://schemas.openxmlformats.org/officeDocument/2006/relationships" xmlns:p="http://schemas.openxmlformats.org/presentationml/2006/main">
+  <p:cSld>
+    <p:spTree>
+      <p:nvGrpSpPr>
+        <p:cNvPr id="1" name=""/>
+        <p:cNvGrpSpPr/>
+        <p:nvPr/>
+      </p:nvGrpSpPr>
+      <p:grpSpPr>
+        <a:xfrm>
+          <a:off x="0" y="0"/>
+          <a:ext cx="0" cy="0"/>
+          <a:chOff x="0" y="0"/>
+          <a:chExt cx="0" cy="0"/>
+        </a:xfrm>
+      </p:grpSpPr>
+      <p:sp>
+        <p:nvSpPr>
+          <p:cNvPr id="2" name="Tittel 1">
+            <a:extLst>
+              <a:ext uri="{FF2B5EF4-FFF2-40B4-BE49-F238E27FC236}">
+                <a16:creationId xmlns:a16="http://schemas.microsoft.com/office/drawing/2014/main" id="{03238D55-E134-E74F-98FC-326D3C760CDA}"/>
+              </a:ext>
+            </a:extLst>
+          </p:cNvPr>
+          <p:cNvSpPr>
+            <a:spLocks noGrp="1"/>
+          </p:cNvSpPr>
+          <p:nvPr>
+            <p:ph type="title"/>
+          </p:nvPr>
+        </p:nvSpPr>
+        <p:spPr>
+          <a:xfrm>
+            <a:off x="539874" y="2889250"/>
+            <a:ext cx="11112251" cy="1079500"/>
+          </a:xfrm>
+        </p:spPr>
+        <p:txBody>
+          <a:bodyPr/>
+          <a:lstStyle/>
+          <a:p>
+            <a:pPr algn="ctr" fontAlgn="base"/>
+            <a:r>
+              <a:rPr lang="en" dirty="0"/>
+              <a:t>Component and Component Architecture  </a:t>
+            </a:r>
+          </a:p>
+        </p:txBody>
+      </p:sp>
+      <p:sp>
+        <p:nvSpPr>
+          <p:cNvPr id="5" name="Plassholder for lysbildenummer 4">
+            <a:extLst>
+              <a:ext uri="{FF2B5EF4-FFF2-40B4-BE49-F238E27FC236}">
+                <a16:creationId xmlns:a16="http://schemas.microsoft.com/office/drawing/2014/main" id="{3CE6C83A-6B1F-6C40-B634-C61A3549A43D}"/>
+              </a:ext>
+            </a:extLst>
+          </p:cNvPr>
+          <p:cNvSpPr>
+            <a:spLocks noGrp="1"/>
+          </p:cNvSpPr>
+          <p:nvPr>
+            <p:ph type="sldNum" sz="quarter" idx="12"/>
+          </p:nvPr>
+        </p:nvSpPr>
+        <p:spPr/>
+        <p:txBody>
+          <a:bodyPr/>
+          <a:lstStyle/>
+          <a:p>
+            <a:fld id="{A92D7E8A-A0E3-4239-9A38-4F8DCAE2A924}" type="slidenum">
+              <a:rPr lang="en-GB" smtClean="0"/>
+              <a:t>16</a:t>
+            </a:fld>
+            <a:endParaRPr lang="en-GB"/>
+          </a:p>
+        </p:txBody>
+      </p:sp>
+      <p:sp>
+        <p:nvSpPr>
+          <p:cNvPr id="7" name="TekstSylinder 6">
+            <a:extLst>
+              <a:ext uri="{FF2B5EF4-FFF2-40B4-BE49-F238E27FC236}">
+                <a16:creationId xmlns:a16="http://schemas.microsoft.com/office/drawing/2014/main" id="{6156B8E4-16B2-1642-BF0A-636A5F10CD72}"/>
+              </a:ext>
+            </a:extLst>
+          </p:cNvPr>
+          <p:cNvSpPr txBox="1"/>
+          <p:nvPr/>
+        </p:nvSpPr>
+        <p:spPr>
+          <a:xfrm>
+            <a:off x="2275489" y="3968750"/>
+            <a:ext cx="7641020" cy="276999"/>
+          </a:xfrm>
+          <a:prstGeom prst="rect">
+            <a:avLst/>
+          </a:prstGeom>
+          <a:noFill/>
+        </p:spPr>
+        <p:txBody>
+          <a:bodyPr wrap="square" lIns="0" tIns="0" rIns="0" bIns="0" rtlCol="0">
+            <a:spAutoFit/>
+          </a:bodyPr>
+          <a:lstStyle/>
+          <a:p>
+            <a:pPr marL="285750" indent="-285750" algn="ctr">
+              <a:buFont typeface="Arial" panose="020B0604020202020204" pitchFamily="34" charset="0"/>
+              <a:buChar char="•"/>
+            </a:pPr>
+            <a:r>
+              <a:rPr lang="en" dirty="0"/>
+              <a:t>Abstractions</a:t>
+            </a:r>
+            <a:endParaRPr lang="en-US" dirty="0" err="1"/>
+          </a:p>
+        </p:txBody>
+      </p:sp>
+    </p:spTree>
+    <p:extLst>
+      <p:ext uri="{BB962C8B-B14F-4D97-AF65-F5344CB8AC3E}">
+        <p14:creationId xmlns:p14="http://schemas.microsoft.com/office/powerpoint/2010/main" val="1194950316"/>
+      </p:ext>
+    </p:extLst>
+  </p:cSld>
+  <p:clrMapOvr>
+    <a:masterClrMapping/>
+  </p:clrMapOvr>
+  <p:transition>
+    <p:fade/>
+  </p:transition>
+</p:sld>
+</file>
+
 <file path=ppt/slides/slide17.xml><?xml version="1.0" encoding="utf-8"?>
 <p:sld xmlns:a="http://schemas.openxmlformats.org/drawingml/2006/main" xmlns:r="http://schemas.openxmlformats.org/officeDocument/2006/relationships" xmlns:p="http://schemas.openxmlformats.org/presentationml/2006/main">
   <p:cSld>
@@ -9589,7 +9704,15 @@
             <a:pPr algn="ctr" fontAlgn="base"/>
             <a:r>
               <a:rPr lang="en" dirty="0"/>
-              <a:t>Component and Component Architecture  </a:t>
+              <a:t>&lt;</a:t>
+            </a:r>
+            <a:r>
+              <a:rPr lang="en" dirty="0" err="1"/>
+              <a:t>MyElem</a:t>
+            </a:r>
+            <a:r>
+              <a:rPr lang="en" dirty="0"/>
+              <a:t> /&gt;</a:t>
             </a:r>
           </a:p>
         </p:txBody>
@@ -9623,50 +9746,10 @@
           </a:p>
         </p:txBody>
       </p:sp>
-      <p:sp>
-        <p:nvSpPr>
-          <p:cNvPr id="7" name="TekstSylinder 6">
-            <a:extLst>
-              <a:ext uri="{FF2B5EF4-FFF2-40B4-BE49-F238E27FC236}">
-                <a16:creationId xmlns:a16="http://schemas.microsoft.com/office/drawing/2014/main" id="{6156B8E4-16B2-1642-BF0A-636A5F10CD72}"/>
-              </a:ext>
-            </a:extLst>
-          </p:cNvPr>
-          <p:cNvSpPr txBox="1"/>
-          <p:nvPr/>
-        </p:nvSpPr>
-        <p:spPr>
-          <a:xfrm>
-            <a:off x="2275489" y="3968750"/>
-            <a:ext cx="7641020" cy="276999"/>
-          </a:xfrm>
-          <a:prstGeom prst="rect">
-            <a:avLst/>
-          </a:prstGeom>
-          <a:noFill/>
-        </p:spPr>
-        <p:txBody>
-          <a:bodyPr wrap="square" lIns="0" tIns="0" rIns="0" bIns="0" rtlCol="0">
-            <a:spAutoFit/>
-          </a:bodyPr>
-          <a:lstStyle/>
-          <a:p>
-            <a:pPr marL="285750" indent="-285750" algn="ctr">
-              <a:buFont typeface="Arial" panose="020B0604020202020204" pitchFamily="34" charset="0"/>
-              <a:buChar char="•"/>
-            </a:pPr>
-            <a:r>
-              <a:rPr lang="en" dirty="0"/>
-              <a:t>Abstractions</a:t>
-            </a:r>
-            <a:endParaRPr lang="en-US" dirty="0" err="1"/>
-          </a:p>
-        </p:txBody>
-      </p:sp>
     </p:spTree>
     <p:extLst>
       <p:ext uri="{BB962C8B-B14F-4D97-AF65-F5344CB8AC3E}">
-        <p14:creationId xmlns:p14="http://schemas.microsoft.com/office/powerpoint/2010/main" val="1194950316"/>
+        <p14:creationId xmlns:p14="http://schemas.microsoft.com/office/powerpoint/2010/main" val="2847063575"/>
       </p:ext>
     </p:extLst>
   </p:cSld>
@@ -9714,27 +9797,48 @@
         </p:nvSpPr>
         <p:spPr>
           <a:xfrm>
-            <a:off x="539874" y="2889250"/>
-            <a:ext cx="11112251" cy="1079500"/>
+            <a:off x="0" y="1795888"/>
+            <a:ext cx="12192000" cy="3266223"/>
           </a:xfrm>
         </p:spPr>
         <p:txBody>
           <a:bodyPr/>
           <a:lstStyle/>
           <a:p>
-            <a:pPr algn="ctr" fontAlgn="base"/>
-            <a:r>
-              <a:rPr lang="en" dirty="0"/>
-              <a:t>&lt;</a:t>
-            </a:r>
-            <a:r>
-              <a:rPr lang="en" dirty="0" err="1"/>
-              <a:t>MyElem</a:t>
-            </a:r>
-            <a:r>
-              <a:rPr lang="en" dirty="0"/>
+            <a:pPr fontAlgn="base"/>
+            <a:br>
+              <a:rPr lang="nb-NO" dirty="0"/>
+            </a:br>
+            <a:br>
+              <a:rPr lang="nb-NO" dirty="0"/>
+            </a:br>
+            <a:r>
+              <a:rPr lang="nb-NO" dirty="0"/>
+              <a:t>				       &lt;div&gt; </a:t>
+            </a:r>
+            <a:br>
+              <a:rPr lang="nb-NO" dirty="0"/>
+            </a:br>
+            <a:r>
+              <a:rPr lang="nb-NO" dirty="0"/>
+              <a:t>					&lt;</a:t>
+            </a:r>
+            <a:r>
+              <a:rPr lang="nb-NO" dirty="0" err="1"/>
+              <a:t>ChuckNorris</a:t>
+            </a:r>
+            <a:r>
+              <a:rPr lang="nb-NO" dirty="0"/>
               <a:t> /&gt;</a:t>
             </a:r>
+            <a:br>
+              <a:rPr lang="nb-NO" dirty="0"/>
+            </a:br>
+            <a:r>
+              <a:rPr lang="nb-NO" dirty="0"/>
+              <a:t> 				       &lt;/div&gt;</a:t>
+            </a:r>
+            <a:endParaRPr lang="en" dirty="0"/>
           </a:p>
         </p:txBody>
       </p:sp>
@@ -9770,7 +9874,7 @@
     </p:spTree>
     <p:extLst>
       <p:ext uri="{BB962C8B-B14F-4D97-AF65-F5344CB8AC3E}">
-        <p14:creationId xmlns:p14="http://schemas.microsoft.com/office/powerpoint/2010/main" val="2847063575"/>
+        <p14:creationId xmlns:p14="http://schemas.microsoft.com/office/powerpoint/2010/main" val="2146241912"/>
       </p:ext>
     </p:extLst>
   </p:cSld>
@@ -9818,48 +9922,19 @@
         </p:nvSpPr>
         <p:spPr>
           <a:xfrm>
-            <a:off x="0" y="1795888"/>
-            <a:ext cx="12192000" cy="3266223"/>
+            <a:off x="539874" y="2889250"/>
+            <a:ext cx="11112251" cy="1079500"/>
           </a:xfrm>
         </p:spPr>
         <p:txBody>
           <a:bodyPr/>
           <a:lstStyle/>
           <a:p>
-            <a:pPr fontAlgn="base"/>
-            <a:br>
-              <a:rPr lang="nb-NO" dirty="0"/>
-            </a:br>
-            <a:br>
-              <a:rPr lang="nb-NO" dirty="0"/>
-            </a:br>
-            <a:r>
-              <a:rPr lang="nb-NO" dirty="0"/>
-              <a:t>				       &lt;div&gt; </a:t>
-            </a:r>
-            <a:br>
-              <a:rPr lang="nb-NO" dirty="0"/>
-            </a:br>
-            <a:r>
-              <a:rPr lang="nb-NO" dirty="0"/>
-              <a:t>					&lt;</a:t>
-            </a:r>
-            <a:r>
-              <a:rPr lang="nb-NO" dirty="0" err="1"/>
-              <a:t>ChuckNorris</a:t>
-            </a:r>
-            <a:r>
-              <a:rPr lang="nb-NO" dirty="0"/>
-              <a:t> /&gt;</a:t>
-            </a:r>
-            <a:br>
-              <a:rPr lang="nb-NO" dirty="0"/>
-            </a:br>
-            <a:r>
-              <a:rPr lang="nb-NO" dirty="0"/>
-              <a:t> 				       &lt;/div&gt;</a:t>
-            </a:r>
-            <a:endParaRPr lang="en" dirty="0"/>
+            <a:pPr algn="ctr" fontAlgn="base"/>
+            <a:r>
+              <a:rPr lang="en" dirty="0"/>
+              <a:t>Dealing with data</a:t>
+            </a:r>
           </a:p>
         </p:txBody>
       </p:sp>
@@ -9892,10 +9967,137 @@
           </a:p>
         </p:txBody>
       </p:sp>
+      <p:sp>
+        <p:nvSpPr>
+          <p:cNvPr id="4" name="TekstSylinder 3">
+            <a:extLst>
+              <a:ext uri="{FF2B5EF4-FFF2-40B4-BE49-F238E27FC236}">
+                <a16:creationId xmlns:a16="http://schemas.microsoft.com/office/drawing/2014/main" id="{84A2A4C9-A78C-7A48-B80E-08413294C447}"/>
+              </a:ext>
+            </a:extLst>
+          </p:cNvPr>
+          <p:cNvSpPr txBox="1"/>
+          <p:nvPr/>
+        </p:nvSpPr>
+        <p:spPr>
+          <a:xfrm>
+            <a:off x="2275489" y="3968750"/>
+            <a:ext cx="7641020" cy="830997"/>
+          </a:xfrm>
+          <a:prstGeom prst="rect">
+            <a:avLst/>
+          </a:prstGeom>
+          <a:noFill/>
+        </p:spPr>
+        <p:txBody>
+          <a:bodyPr wrap="square" lIns="0" tIns="0" rIns="0" bIns="0" rtlCol="0">
+            <a:spAutoFit/>
+          </a:bodyPr>
+          <a:lstStyle/>
+          <a:p>
+            <a:pPr marL="285750" indent="-285750" algn="ctr">
+              <a:buFont typeface="Arial" panose="020B0604020202020204" pitchFamily="34" charset="0"/>
+              <a:buChar char="•"/>
+            </a:pPr>
+            <a:r>
+              <a:rPr lang="en" dirty="0"/>
+              <a:t>   State</a:t>
+            </a:r>
+          </a:p>
+          <a:p>
+            <a:pPr marL="285750" indent="-285750" algn="ctr">
+              <a:buFont typeface="Arial" panose="020B0604020202020204" pitchFamily="34" charset="0"/>
+              <a:buChar char="•"/>
+            </a:pPr>
+            <a:r>
+              <a:rPr lang="en" dirty="0"/>
+              <a:t>Props</a:t>
+            </a:r>
+          </a:p>
+          <a:p>
+            <a:pPr marL="285750" indent="-285750" algn="ctr">
+              <a:buFont typeface="Arial" panose="020B0604020202020204" pitchFamily="34" charset="0"/>
+              <a:buChar char="•"/>
+            </a:pPr>
+            <a:r>
+              <a:rPr lang="en" dirty="0"/>
+              <a:t>Abstractions</a:t>
+            </a:r>
+            <a:endParaRPr lang="en-US" dirty="0" err="1"/>
+          </a:p>
+        </p:txBody>
+      </p:sp>
+      <p:sp>
+        <p:nvSpPr>
+          <p:cNvPr id="3" name="Rektangel 2">
+            <a:extLst>
+              <a:ext uri="{FF2B5EF4-FFF2-40B4-BE49-F238E27FC236}">
+                <a16:creationId xmlns:a16="http://schemas.microsoft.com/office/drawing/2014/main" id="{A87DA9E3-003A-0249-950E-BCA2EEE153A6}"/>
+              </a:ext>
+            </a:extLst>
+          </p:cNvPr>
+          <p:cNvSpPr/>
+          <p:nvPr/>
+        </p:nvSpPr>
+        <p:spPr>
+          <a:xfrm>
+            <a:off x="3374741" y="6052587"/>
+            <a:ext cx="5442516" cy="369332"/>
+          </a:xfrm>
+          <a:prstGeom prst="rect">
+            <a:avLst/>
+          </a:prstGeom>
+        </p:spPr>
+        <p:txBody>
+          <a:bodyPr wrap="none">
+            <a:spAutoFit/>
+          </a:bodyPr>
+          <a:lstStyle/>
+          <a:p>
+            <a:r>
+              <a:rPr lang="en-US" dirty="0">
+                <a:solidFill>
+                  <a:srgbClr val="002060"/>
+                </a:solidFill>
+              </a:rPr>
+              <a:t>https://</a:t>
+            </a:r>
+            <a:r>
+              <a:rPr lang="en-US" dirty="0" err="1">
+                <a:solidFill>
+                  <a:srgbClr val="002060"/>
+                </a:solidFill>
+              </a:rPr>
+              <a:t>reactjs.org</a:t>
+            </a:r>
+            <a:r>
+              <a:rPr lang="en-US" dirty="0">
+                <a:solidFill>
+                  <a:srgbClr val="002060"/>
+                </a:solidFill>
+              </a:rPr>
+              <a:t>/docs/components-and-</a:t>
+            </a:r>
+            <a:r>
+              <a:rPr lang="en-US" dirty="0" err="1">
+                <a:solidFill>
+                  <a:srgbClr val="002060"/>
+                </a:solidFill>
+              </a:rPr>
+              <a:t>props.html</a:t>
+            </a:r>
+            <a:endParaRPr lang="en-US" dirty="0">
+              <a:solidFill>
+                <a:srgbClr val="002060"/>
+              </a:solidFill>
+            </a:endParaRPr>
+          </a:p>
+        </p:txBody>
+      </p:sp>
     </p:spTree>
     <p:extLst>
       <p:ext uri="{BB962C8B-B14F-4D97-AF65-F5344CB8AC3E}">
-        <p14:creationId xmlns:p14="http://schemas.microsoft.com/office/powerpoint/2010/main" val="2146241912"/>
+        <p14:creationId xmlns:p14="http://schemas.microsoft.com/office/powerpoint/2010/main" val="4053446371"/>
       </p:ext>
     </p:extLst>
   </p:cSld>
@@ -10068,7 +10270,7 @@
             <a:pPr algn="ctr" fontAlgn="base"/>
             <a:r>
               <a:rPr lang="en" dirty="0"/>
-              <a:t>Dealing with data</a:t>
+              <a:t>Event Handling</a:t>
             </a:r>
           </a:p>
         </p:txBody>
@@ -10107,7 +10309,7 @@
           <p:cNvPr id="4" name="TekstSylinder 3">
             <a:extLst>
               <a:ext uri="{FF2B5EF4-FFF2-40B4-BE49-F238E27FC236}">
-                <a16:creationId xmlns:a16="http://schemas.microsoft.com/office/drawing/2014/main" id="{84A2A4C9-A78C-7A48-B80E-08413294C447}"/>
+                <a16:creationId xmlns:a16="http://schemas.microsoft.com/office/drawing/2014/main" id="{030082C5-ED4F-8242-9C1F-70029F68124A}"/>
               </a:ext>
             </a:extLst>
           </p:cNvPr>
@@ -10135,9 +10337,10 @@
               <a:buChar char="•"/>
             </a:pPr>
             <a:r>
-              <a:rPr lang="en" dirty="0"/>
-              <a:t>   State</a:t>
-            </a:r>
+              <a:rPr lang="en" dirty="0" err="1"/>
+              <a:t>onClick</a:t>
+            </a:r>
+            <a:endParaRPr lang="en" dirty="0"/>
           </a:p>
           <a:p>
             <a:pPr marL="285750" indent="-285750" algn="ctr">
@@ -10145,8 +10348,16 @@
               <a:buChar char="•"/>
             </a:pPr>
             <a:r>
+              <a:rPr lang="nb-NO" dirty="0"/>
+              <a:t>B</a:t>
+            </a:r>
+            <a:r>
+              <a:rPr lang="en" dirty="0" err="1"/>
+              <a:t>ind</a:t>
+            </a:r>
+            <a:r>
               <a:rPr lang="en" dirty="0"/>
-              <a:t>Props</a:t>
+              <a:t> to function</a:t>
             </a:r>
           </a:p>
           <a:p>
@@ -10156,9 +10367,8 @@
             </a:pPr>
             <a:r>
               <a:rPr lang="en" dirty="0"/>
-              <a:t>Abstractions</a:t>
-            </a:r>
-            <a:endParaRPr lang="en-US" dirty="0" err="1"/>
+              <a:t>methods</a:t>
+            </a:r>
           </a:p>
         </p:txBody>
       </p:sp>
@@ -10167,7 +10377,7 @@
           <p:cNvPr id="3" name="Rektangel 2">
             <a:extLst>
               <a:ext uri="{FF2B5EF4-FFF2-40B4-BE49-F238E27FC236}">
-                <a16:creationId xmlns:a16="http://schemas.microsoft.com/office/drawing/2014/main" id="{A87DA9E3-003A-0249-950E-BCA2EEE153A6}"/>
+                <a16:creationId xmlns:a16="http://schemas.microsoft.com/office/drawing/2014/main" id="{418BF57E-9FC3-974F-805B-E0FA56F53488}"/>
               </a:ext>
             </a:extLst>
           </p:cNvPr>
@@ -10176,8 +10386,8 @@
         </p:nvSpPr>
         <p:spPr>
           <a:xfrm>
-            <a:off x="3374741" y="6052587"/>
-            <a:ext cx="5442516" cy="369332"/>
+            <a:off x="3746638" y="6052587"/>
+            <a:ext cx="4698722" cy="369332"/>
           </a:xfrm>
           <a:prstGeom prst="rect">
             <a:avLst/>
@@ -10211,7 +10421,7 @@
                   <a:srgbClr val="002060"/>
                 </a:solidFill>
               </a:rPr>
-              <a:t>/docs/components-and-</a:t>
+              <a:t>/docs/handling-</a:t>
             </a:r>
             <a:r>
               <a:rPr lang="en-US" dirty="0" err="1">
@@ -10219,7 +10429,7 @@
                   <a:srgbClr val="002060"/>
                 </a:solidFill>
               </a:rPr>
-              <a:t>props.html</a:t>
+              <a:t>events.html</a:t>
             </a:r>
             <a:endParaRPr lang="en-US" dirty="0">
               <a:solidFill>
@@ -10232,7 +10442,7 @@
     </p:spTree>
     <p:extLst>
       <p:ext uri="{BB962C8B-B14F-4D97-AF65-F5344CB8AC3E}">
-        <p14:creationId xmlns:p14="http://schemas.microsoft.com/office/powerpoint/2010/main" val="4053446371"/>
+        <p14:creationId xmlns:p14="http://schemas.microsoft.com/office/powerpoint/2010/main" val="1869139034"/>
       </p:ext>
     </p:extLst>
   </p:cSld>
@@ -10291,7 +10501,14 @@
             <a:pPr algn="ctr" fontAlgn="base"/>
             <a:r>
               <a:rPr lang="en" dirty="0"/>
-              <a:t>Event Handling</a:t>
+              <a:t>Component life cycle  </a:t>
+            </a:r>
+            <a:br>
+              <a:rPr lang="en" dirty="0"/>
+            </a:br>
+            <a:r>
+              <a:rPr lang="en" dirty="0"/>
+              <a:t> </a:t>
             </a:r>
           </a:p>
         </p:txBody>
@@ -10325,145 +10542,10 @@
           </a:p>
         </p:txBody>
       </p:sp>
-      <p:sp>
-        <p:nvSpPr>
-          <p:cNvPr id="4" name="TekstSylinder 3">
-            <a:extLst>
-              <a:ext uri="{FF2B5EF4-FFF2-40B4-BE49-F238E27FC236}">
-                <a16:creationId xmlns:a16="http://schemas.microsoft.com/office/drawing/2014/main" id="{030082C5-ED4F-8242-9C1F-70029F68124A}"/>
-              </a:ext>
-            </a:extLst>
-          </p:cNvPr>
-          <p:cNvSpPr txBox="1"/>
-          <p:nvPr/>
-        </p:nvSpPr>
-        <p:spPr>
-          <a:xfrm>
-            <a:off x="2275489" y="3968750"/>
-            <a:ext cx="7641020" cy="830997"/>
-          </a:xfrm>
-          <a:prstGeom prst="rect">
-            <a:avLst/>
-          </a:prstGeom>
-          <a:noFill/>
-        </p:spPr>
-        <p:txBody>
-          <a:bodyPr wrap="square" lIns="0" tIns="0" rIns="0" bIns="0" rtlCol="0">
-            <a:spAutoFit/>
-          </a:bodyPr>
-          <a:lstStyle/>
-          <a:p>
-            <a:pPr marL="285750" indent="-285750" algn="ctr">
-              <a:buFont typeface="Arial" panose="020B0604020202020204" pitchFamily="34" charset="0"/>
-              <a:buChar char="•"/>
-            </a:pPr>
-            <a:r>
-              <a:rPr lang="en" dirty="0" err="1"/>
-              <a:t>onClick</a:t>
-            </a:r>
-            <a:endParaRPr lang="en" dirty="0"/>
-          </a:p>
-          <a:p>
-            <a:pPr marL="285750" indent="-285750" algn="ctr">
-              <a:buFont typeface="Arial" panose="020B0604020202020204" pitchFamily="34" charset="0"/>
-              <a:buChar char="•"/>
-            </a:pPr>
-            <a:r>
-              <a:rPr lang="nb-NO" dirty="0"/>
-              <a:t>B</a:t>
-            </a:r>
-            <a:r>
-              <a:rPr lang="en" dirty="0" err="1"/>
-              <a:t>ind</a:t>
-            </a:r>
-            <a:r>
-              <a:rPr lang="en" dirty="0"/>
-              <a:t> to function</a:t>
-            </a:r>
-          </a:p>
-          <a:p>
-            <a:pPr marL="285750" indent="-285750" algn="ctr">
-              <a:buFont typeface="Arial" panose="020B0604020202020204" pitchFamily="34" charset="0"/>
-              <a:buChar char="•"/>
-            </a:pPr>
-            <a:r>
-              <a:rPr lang="en" dirty="0"/>
-              <a:t>methods</a:t>
-            </a:r>
-          </a:p>
-        </p:txBody>
-      </p:sp>
-      <p:sp>
-        <p:nvSpPr>
-          <p:cNvPr id="3" name="Rektangel 2">
-            <a:extLst>
-              <a:ext uri="{FF2B5EF4-FFF2-40B4-BE49-F238E27FC236}">
-                <a16:creationId xmlns:a16="http://schemas.microsoft.com/office/drawing/2014/main" id="{418BF57E-9FC3-974F-805B-E0FA56F53488}"/>
-              </a:ext>
-            </a:extLst>
-          </p:cNvPr>
-          <p:cNvSpPr/>
-          <p:nvPr/>
-        </p:nvSpPr>
-        <p:spPr>
-          <a:xfrm>
-            <a:off x="3746638" y="6052587"/>
-            <a:ext cx="4698722" cy="369332"/>
-          </a:xfrm>
-          <a:prstGeom prst="rect">
-            <a:avLst/>
-          </a:prstGeom>
-        </p:spPr>
-        <p:txBody>
-          <a:bodyPr wrap="none">
-            <a:spAutoFit/>
-          </a:bodyPr>
-          <a:lstStyle/>
-          <a:p>
-            <a:r>
-              <a:rPr lang="en-US" dirty="0">
-                <a:solidFill>
-                  <a:srgbClr val="002060"/>
-                </a:solidFill>
-              </a:rPr>
-              <a:t>https://</a:t>
-            </a:r>
-            <a:r>
-              <a:rPr lang="en-US" dirty="0" err="1">
-                <a:solidFill>
-                  <a:srgbClr val="002060"/>
-                </a:solidFill>
-              </a:rPr>
-              <a:t>reactjs.org</a:t>
-            </a:r>
-            <a:r>
-              <a:rPr lang="en-US" dirty="0">
-                <a:solidFill>
-                  <a:srgbClr val="002060"/>
-                </a:solidFill>
-              </a:rPr>
-              <a:t>/docs/handling-</a:t>
-            </a:r>
-            <a:r>
-              <a:rPr lang="en-US" dirty="0" err="1">
-                <a:solidFill>
-                  <a:srgbClr val="002060"/>
-                </a:solidFill>
-              </a:rPr>
-              <a:t>events.html</a:t>
-            </a:r>
-            <a:endParaRPr lang="en-US" dirty="0">
-              <a:solidFill>
-                <a:srgbClr val="002060"/>
-              </a:solidFill>
-            </a:endParaRPr>
-          </a:p>
-        </p:txBody>
-      </p:sp>
     </p:spTree>
     <p:extLst>
       <p:ext uri="{BB962C8B-B14F-4D97-AF65-F5344CB8AC3E}">
-        <p14:creationId xmlns:p14="http://schemas.microsoft.com/office/powerpoint/2010/main" val="1869139034"/>
+        <p14:creationId xmlns:p14="http://schemas.microsoft.com/office/powerpoint/2010/main" val="2413254396"/>
       </p:ext>
     </p:extLst>
   </p:cSld>
@@ -10521,8 +10603,8 @@
           <a:p>
             <a:pPr algn="ctr" fontAlgn="base"/>
             <a:r>
-              <a:rPr lang="en" dirty="0"/>
-              <a:t>Component life cycle  </a:t>
+              <a:rPr lang="en" dirty="0" err="1"/>
+              <a:t>componentDidMount</a:t>
             </a:r>
             <a:br>
               <a:rPr lang="en" dirty="0"/>
@@ -10563,10 +10645,50 @@
           </a:p>
         </p:txBody>
       </p:sp>
+      <p:sp>
+        <p:nvSpPr>
+          <p:cNvPr id="3" name="TekstSylinder 2">
+            <a:extLst>
+              <a:ext uri="{FF2B5EF4-FFF2-40B4-BE49-F238E27FC236}">
+                <a16:creationId xmlns:a16="http://schemas.microsoft.com/office/drawing/2014/main" id="{0DD555CB-6F6E-1F4A-9C13-073D1DB16242}"/>
+              </a:ext>
+            </a:extLst>
+          </p:cNvPr>
+          <p:cNvSpPr txBox="1"/>
+          <p:nvPr/>
+        </p:nvSpPr>
+        <p:spPr>
+          <a:xfrm>
+            <a:off x="2275489" y="3968750"/>
+            <a:ext cx="7641020" cy="276999"/>
+          </a:xfrm>
+          <a:prstGeom prst="rect">
+            <a:avLst/>
+          </a:prstGeom>
+          <a:noFill/>
+        </p:spPr>
+        <p:txBody>
+          <a:bodyPr wrap="square" lIns="0" tIns="0" rIns="0" bIns="0" rtlCol="0">
+            <a:spAutoFit/>
+          </a:bodyPr>
+          <a:lstStyle/>
+          <a:p>
+            <a:pPr marL="285750" indent="-285750" algn="ctr">
+              <a:buFont typeface="Arial" panose="020B0604020202020204" pitchFamily="34" charset="0"/>
+              <a:buChar char="•"/>
+            </a:pPr>
+            <a:r>
+              <a:rPr lang="en" dirty="0"/>
+              <a:t>invoked immediately after a component is mounted</a:t>
+            </a:r>
+            <a:endParaRPr lang="en-US" dirty="0" err="1"/>
+          </a:p>
+        </p:txBody>
+      </p:sp>
     </p:spTree>
     <p:extLst>
       <p:ext uri="{BB962C8B-B14F-4D97-AF65-F5344CB8AC3E}">
-        <p14:creationId xmlns:p14="http://schemas.microsoft.com/office/powerpoint/2010/main" val="2413254396"/>
+        <p14:creationId xmlns:p14="http://schemas.microsoft.com/office/powerpoint/2010/main" val="870866610"/>
       </p:ext>
     </p:extLst>
   </p:cSld>
@@ -10624,8 +10746,8 @@
           <a:p>
             <a:pPr algn="ctr" fontAlgn="base"/>
             <a:r>
-              <a:rPr lang="en" dirty="0" err="1"/>
-              <a:t>componentDidMount</a:t>
+              <a:rPr lang="nb-NO" dirty="0" err="1"/>
+              <a:t>componentDidUpdate</a:t>
             </a:r>
             <a:br>
               <a:rPr lang="en" dirty="0"/>
@@ -10700,7 +10822,7 @@
             </a:pPr>
             <a:r>
               <a:rPr lang="en" dirty="0"/>
-              <a:t>invoked immediately after a component is mounted</a:t>
+              <a:t>invoked immediately after updating occurs</a:t>
             </a:r>
             <a:endParaRPr lang="en-US" dirty="0" err="1"/>
           </a:p>
@@ -10709,7 +10831,7 @@
     </p:spTree>
     <p:extLst>
       <p:ext uri="{BB962C8B-B14F-4D97-AF65-F5344CB8AC3E}">
-        <p14:creationId xmlns:p14="http://schemas.microsoft.com/office/powerpoint/2010/main" val="870866610"/>
+        <p14:creationId xmlns:p14="http://schemas.microsoft.com/office/powerpoint/2010/main" val="2156365516"/>
       </p:ext>
     </p:extLst>
   </p:cSld>
@@ -10768,7 +10890,7 @@
             <a:pPr algn="ctr" fontAlgn="base"/>
             <a:r>
               <a:rPr lang="nb-NO" dirty="0" err="1"/>
-              <a:t>componentDidUpdate</a:t>
+              <a:t>componentWillUnmount</a:t>
             </a:r>
             <a:br>
               <a:rPr lang="en" dirty="0"/>
@@ -10843,7 +10965,7 @@
             </a:pPr>
             <a:r>
               <a:rPr lang="en" dirty="0"/>
-              <a:t>invoked immediately after updating occurs</a:t>
+              <a:t> invoked immediately before a component is unmounted and destroyed</a:t>
             </a:r>
             <a:endParaRPr lang="en-US" dirty="0" err="1"/>
           </a:p>
@@ -10852,7 +10974,7 @@
     </p:spTree>
     <p:extLst>
       <p:ext uri="{BB962C8B-B14F-4D97-AF65-F5344CB8AC3E}">
-        <p14:creationId xmlns:p14="http://schemas.microsoft.com/office/powerpoint/2010/main" val="2156365516"/>
+        <p14:creationId xmlns:p14="http://schemas.microsoft.com/office/powerpoint/2010/main" val="544864102"/>
       </p:ext>
     </p:extLst>
   </p:cSld>
@@ -10911,7 +11033,7 @@
             <a:pPr algn="ctr" fontAlgn="base"/>
             <a:r>
               <a:rPr lang="nb-NO" dirty="0" err="1"/>
-              <a:t>componentWillUnmount</a:t>
+              <a:t>getDerivedStateFromProps</a:t>
             </a:r>
             <a:br>
               <a:rPr lang="en" dirty="0"/>
@@ -10967,7 +11089,7 @@
         <p:spPr>
           <a:xfrm>
             <a:off x="2275489" y="3968750"/>
-            <a:ext cx="7641020" cy="276999"/>
+            <a:ext cx="7641020" cy="553998"/>
           </a:xfrm>
           <a:prstGeom prst="rect">
             <a:avLst/>
@@ -10986,7 +11108,7 @@
             </a:pPr>
             <a:r>
               <a:rPr lang="en" dirty="0"/>
-              <a:t> invoked immediately before a component is unmounted and destroyed</a:t>
+              <a:t>invoked right before calling the render method, both on the initial mount and on subsequent updates</a:t>
             </a:r>
             <a:endParaRPr lang="en-US" dirty="0" err="1"/>
           </a:p>
@@ -10995,7 +11117,7 @@
     </p:spTree>
     <p:extLst>
       <p:ext uri="{BB962C8B-B14F-4D97-AF65-F5344CB8AC3E}">
-        <p14:creationId xmlns:p14="http://schemas.microsoft.com/office/powerpoint/2010/main" val="544864102"/>
+        <p14:creationId xmlns:p14="http://schemas.microsoft.com/office/powerpoint/2010/main" val="2871699963"/>
       </p:ext>
     </p:extLst>
   </p:cSld>
@@ -11054,7 +11176,7 @@
             <a:pPr algn="ctr" fontAlgn="base"/>
             <a:r>
               <a:rPr lang="nb-NO" dirty="0" err="1"/>
-              <a:t>getDerivedStateFromProps</a:t>
+              <a:t>getSnapshotBeforeUpdate</a:t>
             </a:r>
             <a:br>
               <a:rPr lang="en" dirty="0"/>
@@ -11129,7 +11251,7 @@
             </a:pPr>
             <a:r>
               <a:rPr lang="en" dirty="0"/>
-              <a:t>invoked right before calling the render method, both on the initial mount and on subsequent updates</a:t>
+              <a:t> invoked right before the most recently rendered output is committed to e.g. the DOM</a:t>
             </a:r>
             <a:endParaRPr lang="en-US" dirty="0" err="1"/>
           </a:p>
@@ -11138,7 +11260,7 @@
     </p:spTree>
     <p:extLst>
       <p:ext uri="{BB962C8B-B14F-4D97-AF65-F5344CB8AC3E}">
-        <p14:creationId xmlns:p14="http://schemas.microsoft.com/office/powerpoint/2010/main" val="2871699963"/>
+        <p14:creationId xmlns:p14="http://schemas.microsoft.com/office/powerpoint/2010/main" val="2860450742"/>
       </p:ext>
     </p:extLst>
   </p:cSld>
@@ -11197,7 +11319,7 @@
             <a:pPr algn="ctr" fontAlgn="base"/>
             <a:r>
               <a:rPr lang="nb-NO" dirty="0" err="1"/>
-              <a:t>getSnapshotBeforeUpdate</a:t>
+              <a:t>getDerivedStateFromError</a:t>
             </a:r>
             <a:br>
               <a:rPr lang="en" dirty="0"/>
@@ -11253,7 +11375,7 @@
         <p:spPr>
           <a:xfrm>
             <a:off x="2275489" y="3968750"/>
-            <a:ext cx="7641020" cy="553998"/>
+            <a:ext cx="7641020" cy="276999"/>
           </a:xfrm>
           <a:prstGeom prst="rect">
             <a:avLst/>
@@ -11272,7 +11394,7 @@
             </a:pPr>
             <a:r>
               <a:rPr lang="en" dirty="0"/>
-              <a:t> invoked right before the most recently rendered output is committed to e.g. the DOM</a:t>
+              <a:t>  invoked after an error has been thrown by a descendant component</a:t>
             </a:r>
             <a:endParaRPr lang="en-US" dirty="0" err="1"/>
           </a:p>
@@ -11281,7 +11403,7 @@
     </p:spTree>
     <p:extLst>
       <p:ext uri="{BB962C8B-B14F-4D97-AF65-F5344CB8AC3E}">
-        <p14:creationId xmlns:p14="http://schemas.microsoft.com/office/powerpoint/2010/main" val="2860450742"/>
+        <p14:creationId xmlns:p14="http://schemas.microsoft.com/office/powerpoint/2010/main" val="2759675019"/>
       </p:ext>
     </p:extLst>
   </p:cSld>
@@ -11340,7 +11462,7 @@
             <a:pPr algn="ctr" fontAlgn="base"/>
             <a:r>
               <a:rPr lang="nb-NO" dirty="0" err="1"/>
-              <a:t>getDerivedStateFromError</a:t>
+              <a:t>componentDidCatch</a:t>
             </a:r>
             <a:br>
               <a:rPr lang="en" dirty="0"/>
@@ -11415,7 +11537,7 @@
             </a:pPr>
             <a:r>
               <a:rPr lang="en" dirty="0"/>
-              <a:t>  invoked after an error has been thrown by a descendant component</a:t>
+              <a:t>   invoked after an error has been thrown by a descendant component</a:t>
             </a:r>
             <a:endParaRPr lang="en-US" dirty="0" err="1"/>
           </a:p>
@@ -11424,7 +11546,7 @@
     </p:spTree>
     <p:extLst>
       <p:ext uri="{BB962C8B-B14F-4D97-AF65-F5344CB8AC3E}">
-        <p14:creationId xmlns:p14="http://schemas.microsoft.com/office/powerpoint/2010/main" val="2759675019"/>
+        <p14:creationId xmlns:p14="http://schemas.microsoft.com/office/powerpoint/2010/main" val="3345625605"/>
       </p:ext>
     </p:extLst>
   </p:cSld>
@@ -11482,15 +11604,8 @@
           <a:p>
             <a:pPr algn="ctr" fontAlgn="base"/>
             <a:r>
-              <a:rPr lang="nb-NO" dirty="0" err="1"/>
-              <a:t>componentDidCatch</a:t>
-            </a:r>
-            <a:br>
               <a:rPr lang="en" dirty="0"/>
-            </a:br>
-            <a:r>
-              <a:rPr lang="en" dirty="0"/>
-              <a:t> </a:t>
+              <a:t>Fetching data</a:t>
             </a:r>
           </a:p>
         </p:txBody>
@@ -11526,10 +11641,10 @@
       </p:sp>
       <p:sp>
         <p:nvSpPr>
-          <p:cNvPr id="3" name="TekstSylinder 2">
+          <p:cNvPr id="4" name="TekstSylinder 3">
             <a:extLst>
               <a:ext uri="{FF2B5EF4-FFF2-40B4-BE49-F238E27FC236}">
-                <a16:creationId xmlns:a16="http://schemas.microsoft.com/office/drawing/2014/main" id="{0DD555CB-6F6E-1F4A-9C13-073D1DB16242}"/>
+                <a16:creationId xmlns:a16="http://schemas.microsoft.com/office/drawing/2014/main" id="{FFFB5D42-3A0A-2147-88B1-3041AFA96F4A}"/>
               </a:ext>
             </a:extLst>
           </p:cNvPr>
@@ -11539,7 +11654,7 @@
         <p:spPr>
           <a:xfrm>
             <a:off x="2275489" y="3968750"/>
-            <a:ext cx="7641020" cy="276999"/>
+            <a:ext cx="7641020" cy="830997"/>
           </a:xfrm>
           <a:prstGeom prst="rect">
             <a:avLst/>
@@ -11558,16 +11673,41 @@
             </a:pPr>
             <a:r>
               <a:rPr lang="en" dirty="0"/>
-              <a:t>   invoked after an error has been thrown by a descendant component</a:t>
-            </a:r>
-            <a:endParaRPr lang="en-US" dirty="0" err="1"/>
+              <a:t>   </a:t>
+            </a:r>
+            <a:r>
+              <a:rPr lang="en" dirty="0" err="1"/>
+              <a:t>ComponentDidMount</a:t>
+            </a:r>
+            <a:endParaRPr lang="en-US" dirty="0"/>
+          </a:p>
+          <a:p>
+            <a:pPr marL="285750" indent="-285750" algn="ctr">
+              <a:buFont typeface="Arial" panose="020B0604020202020204" pitchFamily="34" charset="0"/>
+              <a:buChar char="•"/>
+            </a:pPr>
+            <a:r>
+              <a:rPr lang="en-US" dirty="0"/>
+              <a:t>State</a:t>
+            </a:r>
+          </a:p>
+          <a:p>
+            <a:pPr marL="285750" indent="-285750" algn="ctr">
+              <a:buFont typeface="Arial" panose="020B0604020202020204" pitchFamily="34" charset="0"/>
+              <a:buChar char="•"/>
+            </a:pPr>
+            <a:r>
+              <a:rPr lang="en-US" dirty="0"/>
+              <a:t>API</a:t>
+            </a:r>
+            <a:endParaRPr lang="en" dirty="0"/>
           </a:p>
         </p:txBody>
       </p:sp>
     </p:spTree>
     <p:extLst>
       <p:ext uri="{BB962C8B-B14F-4D97-AF65-F5344CB8AC3E}">
-        <p14:creationId xmlns:p14="http://schemas.microsoft.com/office/powerpoint/2010/main" val="3345625605"/>
+        <p14:creationId xmlns:p14="http://schemas.microsoft.com/office/powerpoint/2010/main" val="217777647"/>
       </p:ext>
     </p:extLst>
   </p:cSld>
@@ -11704,40 +11844,6 @@
       </p:grpSpPr>
       <p:sp>
         <p:nvSpPr>
-          <p:cNvPr id="2" name="Tittel 1">
-            <a:extLst>
-              <a:ext uri="{FF2B5EF4-FFF2-40B4-BE49-F238E27FC236}">
-                <a16:creationId xmlns:a16="http://schemas.microsoft.com/office/drawing/2014/main" id="{03238D55-E134-E74F-98FC-326D3C760CDA}"/>
-              </a:ext>
-            </a:extLst>
-          </p:cNvPr>
-          <p:cNvSpPr>
-            <a:spLocks noGrp="1"/>
-          </p:cNvSpPr>
-          <p:nvPr>
-            <p:ph type="title"/>
-          </p:nvPr>
-        </p:nvSpPr>
-        <p:spPr>
-          <a:xfrm>
-            <a:off x="539874" y="2889250"/>
-            <a:ext cx="11112251" cy="1079500"/>
-          </a:xfrm>
-        </p:spPr>
-        <p:txBody>
-          <a:bodyPr/>
-          <a:lstStyle/>
-          <a:p>
-            <a:pPr algn="ctr" fontAlgn="base"/>
-            <a:r>
-              <a:rPr lang="en" dirty="0"/>
-              <a:t>Fetching data</a:t>
-            </a:r>
-          </a:p>
-        </p:txBody>
-      </p:sp>
-      <p:sp>
-        <p:nvSpPr>
           <p:cNvPr id="5" name="Plassholder for lysbildenummer 4">
             <a:extLst>
               <a:ext uri="{FF2B5EF4-FFF2-40B4-BE49-F238E27FC236}">
@@ -11760,133 +11866,6 @@
             <a:fld id="{A92D7E8A-A0E3-4239-9A38-4F8DCAE2A924}" type="slidenum">
               <a:rPr lang="en-GB" smtClean="0"/>
               <a:t>30</a:t>
-            </a:fld>
-            <a:endParaRPr lang="en-GB"/>
-          </a:p>
-        </p:txBody>
-      </p:sp>
-      <p:sp>
-        <p:nvSpPr>
-          <p:cNvPr id="4" name="TekstSylinder 3">
-            <a:extLst>
-              <a:ext uri="{FF2B5EF4-FFF2-40B4-BE49-F238E27FC236}">
-                <a16:creationId xmlns:a16="http://schemas.microsoft.com/office/drawing/2014/main" id="{FFFB5D42-3A0A-2147-88B1-3041AFA96F4A}"/>
-              </a:ext>
-            </a:extLst>
-          </p:cNvPr>
-          <p:cNvSpPr txBox="1"/>
-          <p:nvPr/>
-        </p:nvSpPr>
-        <p:spPr>
-          <a:xfrm>
-            <a:off x="2275489" y="3968750"/>
-            <a:ext cx="7641020" cy="830997"/>
-          </a:xfrm>
-          <a:prstGeom prst="rect">
-            <a:avLst/>
-          </a:prstGeom>
-          <a:noFill/>
-        </p:spPr>
-        <p:txBody>
-          <a:bodyPr wrap="square" lIns="0" tIns="0" rIns="0" bIns="0" rtlCol="0">
-            <a:spAutoFit/>
-          </a:bodyPr>
-          <a:lstStyle/>
-          <a:p>
-            <a:pPr marL="285750" indent="-285750" algn="ctr">
-              <a:buFont typeface="Arial" panose="020B0604020202020204" pitchFamily="34" charset="0"/>
-              <a:buChar char="•"/>
-            </a:pPr>
-            <a:r>
-              <a:rPr lang="en" dirty="0"/>
-              <a:t>   </a:t>
-            </a:r>
-            <a:r>
-              <a:rPr lang="en" dirty="0" err="1"/>
-              <a:t>ComponentDidMount</a:t>
-            </a:r>
-            <a:endParaRPr lang="en-US" dirty="0"/>
-          </a:p>
-          <a:p>
-            <a:pPr marL="285750" indent="-285750" algn="ctr">
-              <a:buFont typeface="Arial" panose="020B0604020202020204" pitchFamily="34" charset="0"/>
-              <a:buChar char="•"/>
-            </a:pPr>
-            <a:r>
-              <a:rPr lang="en-US" dirty="0"/>
-              <a:t>State</a:t>
-            </a:r>
-          </a:p>
-          <a:p>
-            <a:pPr marL="285750" indent="-285750" algn="ctr">
-              <a:buFont typeface="Arial" panose="020B0604020202020204" pitchFamily="34" charset="0"/>
-              <a:buChar char="•"/>
-            </a:pPr>
-            <a:r>
-              <a:rPr lang="en-US" dirty="0"/>
-              <a:t>API</a:t>
-            </a:r>
-            <a:endParaRPr lang="en" dirty="0"/>
-          </a:p>
-        </p:txBody>
-      </p:sp>
-    </p:spTree>
-    <p:extLst>
-      <p:ext uri="{BB962C8B-B14F-4D97-AF65-F5344CB8AC3E}">
-        <p14:creationId xmlns:p14="http://schemas.microsoft.com/office/powerpoint/2010/main" val="217777647"/>
-      </p:ext>
-    </p:extLst>
-  </p:cSld>
-  <p:clrMapOvr>
-    <a:masterClrMapping/>
-  </p:clrMapOvr>
-  <p:transition>
-    <p:fade/>
-  </p:transition>
-</p:sld>
-</file>
-
-<file path=ppt/slides/slide31.xml><?xml version="1.0" encoding="utf-8"?>
-<p:sld xmlns:a="http://schemas.openxmlformats.org/drawingml/2006/main" xmlns:r="http://schemas.openxmlformats.org/officeDocument/2006/relationships" xmlns:p="http://schemas.openxmlformats.org/presentationml/2006/main">
-  <p:cSld>
-    <p:spTree>
-      <p:nvGrpSpPr>
-        <p:cNvPr id="1" name=""/>
-        <p:cNvGrpSpPr/>
-        <p:nvPr/>
-      </p:nvGrpSpPr>
-      <p:grpSpPr>
-        <a:xfrm>
-          <a:off x="0" y="0"/>
-          <a:ext cx="0" cy="0"/>
-          <a:chOff x="0" y="0"/>
-          <a:chExt cx="0" cy="0"/>
-        </a:xfrm>
-      </p:grpSpPr>
-      <p:sp>
-        <p:nvSpPr>
-          <p:cNvPr id="5" name="Plassholder for lysbildenummer 4">
-            <a:extLst>
-              <a:ext uri="{FF2B5EF4-FFF2-40B4-BE49-F238E27FC236}">
-                <a16:creationId xmlns:a16="http://schemas.microsoft.com/office/drawing/2014/main" id="{3CE6C83A-6B1F-6C40-B634-C61A3549A43D}"/>
-              </a:ext>
-            </a:extLst>
-          </p:cNvPr>
-          <p:cNvSpPr>
-            <a:spLocks noGrp="1"/>
-          </p:cNvSpPr>
-          <p:nvPr>
-            <p:ph type="sldNum" sz="quarter" idx="12"/>
-          </p:nvPr>
-        </p:nvSpPr>
-        <p:spPr/>
-        <p:txBody>
-          <a:bodyPr/>
-          <a:lstStyle/>
-          <a:p>
-            <a:fld id="{A92D7E8A-A0E3-4239-9A38-4F8DCAE2A924}" type="slidenum">
-              <a:rPr lang="en-GB" smtClean="0"/>
-              <a:t>31</a:t>
             </a:fld>
             <a:endParaRPr lang="en-GB"/>
           </a:p>
@@ -11938,6 +11917,62 @@
 </p:sld>
 </file>
 
+<file path=ppt/slides/slide31.xml><?xml version="1.0" encoding="utf-8"?>
+<p:sld xmlns:a="http://schemas.openxmlformats.org/drawingml/2006/main" xmlns:r="http://schemas.openxmlformats.org/officeDocument/2006/relationships" xmlns:p="http://schemas.openxmlformats.org/presentationml/2006/main">
+  <p:cSld>
+    <p:spTree>
+      <p:nvGrpSpPr>
+        <p:cNvPr id="1" name=""/>
+        <p:cNvGrpSpPr/>
+        <p:nvPr/>
+      </p:nvGrpSpPr>
+      <p:grpSpPr>
+        <a:xfrm>
+          <a:off x="0" y="0"/>
+          <a:ext cx="0" cy="0"/>
+          <a:chOff x="0" y="0"/>
+          <a:chExt cx="0" cy="0"/>
+        </a:xfrm>
+      </p:grpSpPr>
+      <p:sp>
+        <p:nvSpPr>
+          <p:cNvPr id="7" name="Title 6"/>
+          <p:cNvSpPr>
+            <a:spLocks noGrp="1"/>
+          </p:cNvSpPr>
+          <p:nvPr>
+            <p:ph type="ctrTitle"/>
+          </p:nvPr>
+        </p:nvSpPr>
+        <p:spPr/>
+        <p:txBody>
+          <a:bodyPr/>
+          <a:lstStyle/>
+          <a:p>
+            <a:r>
+              <a:rPr lang="en-US" dirty="0"/>
+              <a:t>Single Page Application and Deployment</a:t>
+            </a:r>
+            <a:endParaRPr lang="en-GB" dirty="0"/>
+          </a:p>
+        </p:txBody>
+      </p:sp>
+    </p:spTree>
+    <p:extLst>
+      <p:ext uri="{BB962C8B-B14F-4D97-AF65-F5344CB8AC3E}">
+        <p14:creationId xmlns:p14="http://schemas.microsoft.com/office/powerpoint/2010/main" val="4098863298"/>
+      </p:ext>
+    </p:extLst>
+  </p:cSld>
+  <p:clrMapOvr>
+    <a:masterClrMapping/>
+  </p:clrMapOvr>
+  <p:transition>
+    <p:fade/>
+  </p:transition>
+</p:sld>
+</file>
+
 <file path=ppt/slides/slide32.xml><?xml version="1.0" encoding="utf-8"?>
 <p:sld xmlns:a="http://schemas.openxmlformats.org/drawingml/2006/main" xmlns:r="http://schemas.openxmlformats.org/officeDocument/2006/relationships" xmlns:p="http://schemas.openxmlformats.org/presentationml/2006/main">
   <p:cSld>
@@ -11957,62 +11992,6 @@
       </p:grpSpPr>
       <p:sp>
         <p:nvSpPr>
-          <p:cNvPr id="7" name="Title 6"/>
-          <p:cNvSpPr>
-            <a:spLocks noGrp="1"/>
-          </p:cNvSpPr>
-          <p:nvPr>
-            <p:ph type="ctrTitle"/>
-          </p:nvPr>
-        </p:nvSpPr>
-        <p:spPr/>
-        <p:txBody>
-          <a:bodyPr/>
-          <a:lstStyle/>
-          <a:p>
-            <a:r>
-              <a:rPr lang="en-US" dirty="0"/>
-              <a:t>Single Page Application and Deployment</a:t>
-            </a:r>
-            <a:endParaRPr lang="en-GB" dirty="0"/>
-          </a:p>
-        </p:txBody>
-      </p:sp>
-    </p:spTree>
-    <p:extLst>
-      <p:ext uri="{BB962C8B-B14F-4D97-AF65-F5344CB8AC3E}">
-        <p14:creationId xmlns:p14="http://schemas.microsoft.com/office/powerpoint/2010/main" val="4098863298"/>
-      </p:ext>
-    </p:extLst>
-  </p:cSld>
-  <p:clrMapOvr>
-    <a:masterClrMapping/>
-  </p:clrMapOvr>
-  <p:transition>
-    <p:fade/>
-  </p:transition>
-</p:sld>
-</file>
-
-<file path=ppt/slides/slide33.xml><?xml version="1.0" encoding="utf-8"?>
-<p:sld xmlns:a="http://schemas.openxmlformats.org/drawingml/2006/main" xmlns:r="http://schemas.openxmlformats.org/officeDocument/2006/relationships" xmlns:p="http://schemas.openxmlformats.org/presentationml/2006/main">
-  <p:cSld>
-    <p:spTree>
-      <p:nvGrpSpPr>
-        <p:cNvPr id="1" name=""/>
-        <p:cNvGrpSpPr/>
-        <p:nvPr/>
-      </p:nvGrpSpPr>
-      <p:grpSpPr>
-        <a:xfrm>
-          <a:off x="0" y="0"/>
-          <a:ext cx="0" cy="0"/>
-          <a:chOff x="0" y="0"/>
-          <a:chExt cx="0" cy="0"/>
-        </a:xfrm>
-      </p:grpSpPr>
-      <p:sp>
-        <p:nvSpPr>
           <p:cNvPr id="2" name="Title 1"/>
           <p:cNvSpPr>
             <a:spLocks noGrp="1"/>
@@ -12051,7 +12030,7 @@
             <a:fld id="{A92D7E8A-A0E3-4239-9A38-4F8DCAE2A924}" type="slidenum">
               <a:rPr lang="en-GB" smtClean="0"/>
               <a:pPr/>
-              <a:t>33</a:t>
+              <a:t>32</a:t>
             </a:fld>
             <a:endParaRPr lang="en-GB"/>
           </a:p>
@@ -14093,7 +14072,12 @@
             <p:ph type="sldNum" sz="quarter" idx="12"/>
           </p:nvPr>
         </p:nvSpPr>
-        <p:spPr/>
+        <p:spPr>
+          <a:xfrm>
+            <a:off x="539999" y="6421919"/>
+            <a:ext cx="432000" cy="153888"/>
+          </a:xfrm>
+        </p:spPr>
         <p:txBody>
           <a:bodyPr/>
           <a:lstStyle/>
@@ -14106,10 +14090,49 @@
           </a:p>
         </p:txBody>
       </p:sp>
+      <p:sp>
+        <p:nvSpPr>
+          <p:cNvPr id="3" name="TekstSylinder 2">
+            <a:extLst>
+              <a:ext uri="{FF2B5EF4-FFF2-40B4-BE49-F238E27FC236}">
+                <a16:creationId xmlns:a16="http://schemas.microsoft.com/office/drawing/2014/main" id="{B1CBB8A3-39D3-4FD6-9AB0-310865775B1D}"/>
+              </a:ext>
+            </a:extLst>
+          </p:cNvPr>
+          <p:cNvSpPr txBox="1"/>
+          <p:nvPr/>
+        </p:nvSpPr>
+        <p:spPr>
+          <a:xfrm>
+            <a:off x="0" y="3852909"/>
+            <a:ext cx="12191999" cy="830997"/>
+          </a:xfrm>
+          <a:prstGeom prst="rect">
+            <a:avLst/>
+          </a:prstGeom>
+          <a:noFill/>
+        </p:spPr>
+        <p:txBody>
+          <a:bodyPr wrap="square" lIns="0" tIns="0" rIns="0" bIns="0" rtlCol="0">
+            <a:spAutoFit/>
+          </a:bodyPr>
+          <a:lstStyle/>
+          <a:p>
+            <a:pPr algn="ctr"/>
+            <a:r>
+              <a:rPr lang="nb-NO" sz="5400" dirty="0">
+                <a:hlinkClick r:id="rId3"/>
+              </a:rPr>
+              <a:t>https://codesandbox.io/s/4z6mwy7oj4</a:t>
+            </a:r>
+            <a:endParaRPr lang="nb-NO" sz="5400" dirty="0"/>
+          </a:p>
+        </p:txBody>
+      </p:sp>
     </p:spTree>
     <p:extLst>
       <p:ext uri="{BB962C8B-B14F-4D97-AF65-F5344CB8AC3E}">
-        <p14:creationId xmlns:p14="http://schemas.microsoft.com/office/powerpoint/2010/main" val="1829925124"/>
+        <p14:creationId xmlns:p14="http://schemas.microsoft.com/office/powerpoint/2010/main" val="3180510189"/>
       </p:ext>
     </p:extLst>
   </p:cSld>
@@ -14141,71 +14164,31 @@
       </p:grpSpPr>
       <p:sp>
         <p:nvSpPr>
-          <p:cNvPr id="2" name="Tittel 1">
-            <a:extLst>
-              <a:ext uri="{FF2B5EF4-FFF2-40B4-BE49-F238E27FC236}">
-                <a16:creationId xmlns:a16="http://schemas.microsoft.com/office/drawing/2014/main" id="{FDA002D1-67C2-364C-87D2-C000C4C3B799}"/>
-              </a:ext>
-            </a:extLst>
-          </p:cNvPr>
-          <p:cNvSpPr>
-            <a:spLocks noGrp="1"/>
-          </p:cNvSpPr>
-          <p:nvPr>
-            <p:ph type="title"/>
-          </p:nvPr>
-        </p:nvSpPr>
-        <p:spPr>
-          <a:xfrm>
-            <a:off x="539999" y="2349500"/>
-            <a:ext cx="11112251" cy="1079500"/>
-          </a:xfrm>
-        </p:spPr>
+          <p:cNvPr id="7" name="Title 6"/>
+          <p:cNvSpPr>
+            <a:spLocks noGrp="1"/>
+          </p:cNvSpPr>
+          <p:nvPr>
+            <p:ph type="ctrTitle"/>
+          </p:nvPr>
+        </p:nvSpPr>
+        <p:spPr/>
         <p:txBody>
           <a:bodyPr/>
           <a:lstStyle/>
           <a:p>
-            <a:pPr algn="ctr"/>
             <a:r>
               <a:rPr lang="en-US" dirty="0"/>
-              <a:t>Demo Time</a:t>
-            </a:r>
-          </a:p>
-        </p:txBody>
-      </p:sp>
-      <p:sp>
-        <p:nvSpPr>
-          <p:cNvPr id="5" name="Plassholder for lysbildenummer 4">
-            <a:extLst>
-              <a:ext uri="{FF2B5EF4-FFF2-40B4-BE49-F238E27FC236}">
-                <a16:creationId xmlns:a16="http://schemas.microsoft.com/office/drawing/2014/main" id="{344D6F99-2699-FD41-99C5-16C09B4C50D9}"/>
-              </a:ext>
-            </a:extLst>
-          </p:cNvPr>
-          <p:cNvSpPr>
-            <a:spLocks noGrp="1"/>
-          </p:cNvSpPr>
-          <p:nvPr>
-            <p:ph type="sldNum" sz="quarter" idx="12"/>
-          </p:nvPr>
-        </p:nvSpPr>
-        <p:spPr/>
-        <p:txBody>
-          <a:bodyPr/>
-          <a:lstStyle/>
-          <a:p>
-            <a:fld id="{A92D7E8A-A0E3-4239-9A38-4F8DCAE2A924}" type="slidenum">
-              <a:rPr lang="en-GB" smtClean="0"/>
-              <a:t>7</a:t>
-            </a:fld>
-            <a:endParaRPr lang="en-GB"/>
+              <a:t>React</a:t>
+            </a:r>
+            <a:endParaRPr lang="en-GB" dirty="0"/>
           </a:p>
         </p:txBody>
       </p:sp>
     </p:spTree>
     <p:extLst>
       <p:ext uri="{BB962C8B-B14F-4D97-AF65-F5344CB8AC3E}">
-        <p14:creationId xmlns:p14="http://schemas.microsoft.com/office/powerpoint/2010/main" val="3180510189"/>
+        <p14:creationId xmlns:p14="http://schemas.microsoft.com/office/powerpoint/2010/main" val="384584295"/>
       </p:ext>
     </p:extLst>
   </p:cSld>
@@ -14237,12 +14220,12 @@
       </p:grpSpPr>
       <p:sp>
         <p:nvSpPr>
-          <p:cNvPr id="7" name="Title 6"/>
-          <p:cNvSpPr>
-            <a:spLocks noGrp="1"/>
-          </p:cNvSpPr>
-          <p:nvPr>
-            <p:ph type="ctrTitle"/>
+          <p:cNvPr id="3" name="Title 2"/>
+          <p:cNvSpPr>
+            <a:spLocks noGrp="1"/>
+          </p:cNvSpPr>
+          <p:nvPr>
+            <p:ph type="title"/>
           </p:nvPr>
         </p:nvSpPr>
         <p:spPr/>
@@ -14251,9 +14234,51 @@
           <a:lstStyle/>
           <a:p>
             <a:r>
-              <a:rPr lang="en-US" dirty="0"/>
-              <a:t>React</a:t>
-            </a:r>
+              <a:rPr lang="en-GB" dirty="0"/>
+              <a:t>What is react, and why do I need it?</a:t>
+            </a:r>
+          </a:p>
+        </p:txBody>
+      </p:sp>
+      <p:sp>
+        <p:nvSpPr>
+          <p:cNvPr id="7" name="Slide Number Placeholder 6"/>
+          <p:cNvSpPr>
+            <a:spLocks noGrp="1"/>
+          </p:cNvSpPr>
+          <p:nvPr>
+            <p:ph type="sldNum" sz="quarter" idx="12"/>
+          </p:nvPr>
+        </p:nvSpPr>
+        <p:spPr/>
+        <p:txBody>
+          <a:bodyPr/>
+          <a:lstStyle/>
+          <a:p>
+            <a:fld id="{A92D7E8A-A0E3-4239-9A38-4F8DCAE2A924}" type="slidenum">
+              <a:rPr lang="en-GB" smtClean="0"/>
+              <a:pPr/>
+              <a:t>8</a:t>
+            </a:fld>
+            <a:endParaRPr lang="en-GB"/>
+          </a:p>
+        </p:txBody>
+      </p:sp>
+      <p:sp>
+        <p:nvSpPr>
+          <p:cNvPr id="2" name="Content Placeholder 1"/>
+          <p:cNvSpPr>
+            <a:spLocks noGrp="1"/>
+          </p:cNvSpPr>
+          <p:nvPr>
+            <p:ph type="body" sz="quarter" idx="13"/>
+          </p:nvPr>
+        </p:nvSpPr>
+        <p:spPr/>
+        <p:txBody>
+          <a:bodyPr/>
+          <a:lstStyle/>
+          <a:p>
             <a:endParaRPr lang="en-GB" dirty="0"/>
           </a:p>
         </p:txBody>
@@ -14261,7 +14286,7 @@
     </p:spTree>
     <p:extLst>
       <p:ext uri="{BB962C8B-B14F-4D97-AF65-F5344CB8AC3E}">
-        <p14:creationId xmlns:p14="http://schemas.microsoft.com/office/powerpoint/2010/main" val="384584295"/>
+        <p14:creationId xmlns:p14="http://schemas.microsoft.com/office/powerpoint/2010/main" val="858672426"/>
       </p:ext>
     </p:extLst>
   </p:cSld>
@@ -14293,7 +14318,13 @@
       </p:grpSpPr>
       <p:sp>
         <p:nvSpPr>
-          <p:cNvPr id="3" name="Title 2"/>
+          <p:cNvPr id="2" name="Tittel 1">
+            <a:extLst>
+              <a:ext uri="{FF2B5EF4-FFF2-40B4-BE49-F238E27FC236}">
+                <a16:creationId xmlns:a16="http://schemas.microsoft.com/office/drawing/2014/main" id="{0220A24C-4FC3-43B6-8A21-EDC4A2287F02}"/>
+              </a:ext>
+            </a:extLst>
+          </p:cNvPr>
           <p:cNvSpPr>
             <a:spLocks noGrp="1"/>
           </p:cNvSpPr>
@@ -14307,20 +14338,26 @@
           <a:lstStyle/>
           <a:p>
             <a:r>
-              <a:rPr lang="en-GB" dirty="0"/>
-              <a:t>The problem we are trying to solve with React</a:t>
-            </a:r>
-          </a:p>
-        </p:txBody>
-      </p:sp>
-      <p:sp>
-        <p:nvSpPr>
-          <p:cNvPr id="7" name="Slide Number Placeholder 6"/>
-          <p:cNvSpPr>
-            <a:spLocks noGrp="1"/>
-          </p:cNvSpPr>
-          <p:nvPr>
-            <p:ph type="sldNum" sz="quarter" idx="12"/>
+              <a:rPr lang="nb-NO" dirty="0"/>
+              <a:t>Web: HTML, CSS, JS</a:t>
+            </a:r>
+          </a:p>
+        </p:txBody>
+      </p:sp>
+      <p:sp>
+        <p:nvSpPr>
+          <p:cNvPr id="3" name="Plassholder for dato 2">
+            <a:extLst>
+              <a:ext uri="{FF2B5EF4-FFF2-40B4-BE49-F238E27FC236}">
+                <a16:creationId xmlns:a16="http://schemas.microsoft.com/office/drawing/2014/main" id="{12D8C96F-B569-43F0-AEFA-83A7695BCE27}"/>
+              </a:ext>
+            </a:extLst>
+          </p:cNvPr>
+          <p:cNvSpPr>
+            <a:spLocks noGrp="1"/>
+          </p:cNvSpPr>
+          <p:nvPr>
+            <p:ph type="dt" sz="half" idx="10"/>
           </p:nvPr>
         </p:nvSpPr>
         <p:spPr/>
@@ -14328,9 +14365,65 @@
           <a:bodyPr/>
           <a:lstStyle/>
           <a:p>
+            <a:fld id="{2C548132-30BE-4A49-A2CE-3A2F04FC86C6}" type="datetime1">
+              <a:rPr lang="sv-SE" smtClean="0"/>
+              <a:t>2019-01-18</a:t>
+            </a:fld>
+            <a:endParaRPr lang="en-GB"/>
+          </a:p>
+        </p:txBody>
+      </p:sp>
+      <p:sp>
+        <p:nvSpPr>
+          <p:cNvPr id="4" name="Plassholder for bunntekst 3">
+            <a:extLst>
+              <a:ext uri="{FF2B5EF4-FFF2-40B4-BE49-F238E27FC236}">
+                <a16:creationId xmlns:a16="http://schemas.microsoft.com/office/drawing/2014/main" id="{F7448D7A-AD9E-4D46-8591-82EC0D5F7E11}"/>
+              </a:ext>
+            </a:extLst>
+          </p:cNvPr>
+          <p:cNvSpPr>
+            <a:spLocks noGrp="1"/>
+          </p:cNvSpPr>
+          <p:nvPr>
+            <p:ph type="ftr" sz="quarter" idx="11"/>
+          </p:nvPr>
+        </p:nvSpPr>
+        <p:spPr/>
+        <p:txBody>
+          <a:bodyPr/>
+          <a:lstStyle/>
+          <a:p>
+            <a:r>
+              <a:rPr lang="en-GB"/>
+              <a:t>Confidentiality class    Relation    Identifier    Version    Status</a:t>
+            </a:r>
+          </a:p>
+        </p:txBody>
+      </p:sp>
+      <p:sp>
+        <p:nvSpPr>
+          <p:cNvPr id="5" name="Plassholder for lysbildenummer 4">
+            <a:extLst>
+              <a:ext uri="{FF2B5EF4-FFF2-40B4-BE49-F238E27FC236}">
+                <a16:creationId xmlns:a16="http://schemas.microsoft.com/office/drawing/2014/main" id="{5508CFAC-52F0-41BD-A14C-C830750A6AD0}"/>
+              </a:ext>
+            </a:extLst>
+          </p:cNvPr>
+          <p:cNvSpPr>
+            <a:spLocks noGrp="1"/>
+          </p:cNvSpPr>
+          <p:nvPr>
+            <p:ph type="sldNum" sz="quarter" idx="12"/>
+          </p:nvPr>
+        </p:nvSpPr>
+        <p:spPr/>
+        <p:txBody>
+          <a:bodyPr/>
+          <a:lstStyle/>
+          <a:p>
             <a:fld id="{A92D7E8A-A0E3-4239-9A38-4F8DCAE2A924}" type="slidenum">
               <a:rPr lang="en-GB" smtClean="0"/>
-              <a:pPr/>
               <a:t>9</a:t>
             </a:fld>
             <a:endParaRPr lang="en-GB"/>
@@ -14339,7 +14432,13 @@
       </p:sp>
       <p:sp>
         <p:nvSpPr>
-          <p:cNvPr id="2" name="Content Placeholder 1"/>
+          <p:cNvPr id="6" name="Plassholder for tekst 5">
+            <a:extLst>
+              <a:ext uri="{FF2B5EF4-FFF2-40B4-BE49-F238E27FC236}">
+                <a16:creationId xmlns:a16="http://schemas.microsoft.com/office/drawing/2014/main" id="{9A361593-4F81-4D5D-B332-3722E8B7A6F4}"/>
+              </a:ext>
+            </a:extLst>
+          </p:cNvPr>
           <p:cNvSpPr>
             <a:spLocks noGrp="1"/>
           </p:cNvSpPr>
@@ -14352,25 +14451,14 @@
           <a:bodyPr/>
           <a:lstStyle/>
           <a:p>
-            <a:r>
-              <a:rPr lang="en-GB" dirty="0"/>
-              <a:t>Complex functionality, separation of concern </a:t>
-            </a:r>
-            <a:r>
-              <a:rPr lang="en-GB" strike="sngStrike" dirty="0"/>
-              <a:t>is</a:t>
-            </a:r>
-            <a:r>
-              <a:rPr lang="en-GB" dirty="0"/>
-              <a:t> was hard in JavaScript</a:t>
-            </a:r>
+            <a:endParaRPr lang="nb-NO"/>
           </a:p>
         </p:txBody>
       </p:sp>
     </p:spTree>
     <p:extLst>
       <p:ext uri="{BB962C8B-B14F-4D97-AF65-F5344CB8AC3E}">
-        <p14:creationId xmlns:p14="http://schemas.microsoft.com/office/powerpoint/2010/main" val="858672426"/>
+        <p14:creationId xmlns:p14="http://schemas.microsoft.com/office/powerpoint/2010/main" val="3186000734"/>
       </p:ext>
     </p:extLst>
   </p:cSld>
@@ -15188,36 +15276,6 @@
 </file>
 
 <file path=customXml/item1.xml><?xml version="1.0" encoding="utf-8"?>
-<p:properties xmlns:p="http://schemas.microsoft.com/office/2006/metadata/properties" xmlns:xsi="http://www.w3.org/2001/XMLSchema-instance" xmlns:pc="http://schemas.microsoft.com/office/infopath/2007/PartnerControls">
-  <documentManagement>
-    <TaskDueDate xmlns="http://schemas.microsoft.com/sharepoint/v3/fields" xsi:nil="true"/>
-    <Company xmlns="e5aeb5b9-f0ac-43fe-be4d-b709ab7af9db">19</Company>
-    <Responsible xmlns="e5aeb5b9-f0ac-43fe-be4d-b709ab7af9db">
-      <UserInfo>
-        <DisplayName/>
-        <AccountId xsi:nil="true"/>
-        <AccountType/>
-      </UserInfo>
-    </Responsible>
-    <TaxCatchAll xmlns="9030490b-a065-445c-b4f2-893993bd2fc8">
-      <Value>26</Value>
-    </TaxCatchAll>
-    <e6eaa2c09e154499b5a9dbe111cac137 xmlns="e5aeb5b9-f0ac-43fe-be4d-b709ab7af9db">
-      <Terms xmlns="http://schemas.microsoft.com/office/infopath/2007/PartnerControls">
-        <TermInfo xmlns="http://schemas.microsoft.com/office/infopath/2007/PartnerControls">
-          <TermName xmlns="http://schemas.microsoft.com/office/infopath/2007/PartnerControls">Documents</TermName>
-          <TermId xmlns="http://schemas.microsoft.com/office/infopath/2007/PartnerControls">51336ce3-f898-44a1-a9f6-ec04e30d07be</TermId>
-        </TermInfo>
-      </Terms>
-    </e6eaa2c09e154499b5a9dbe111cac137>
-    <TaxKeywordTaxHTField xmlns="9030490b-a065-445c-b4f2-893993bd2fc8">
-      <Terms xmlns="http://schemas.microsoft.com/office/infopath/2007/PartnerControls"/>
-    </TaxKeywordTaxHTField>
-  </documentManagement>
-</p:properties>
-</file>
-
-<file path=customXml/item2.xml><?xml version="1.0" encoding="utf-8"?>
 <ct:contentTypeSchema xmlns:ct="http://schemas.microsoft.com/office/2006/metadata/contentType" xmlns:ma="http://schemas.microsoft.com/office/2006/metadata/properties/metaAttributes" ct:_="" ma:_="" ma:contentTypeName="Document" ma:contentTypeID="0x0101000E5D312C3242DE46BDADFABB19FDB9F0" ma:contentTypeVersion="12" ma:contentTypeDescription="Create a new document." ma:contentTypeScope="" ma:versionID="9af34400cb2ecc743774ef7b51a0d7c0">
   <xsd:schema xmlns:xsd="http://www.w3.org/2001/XMLSchema" xmlns:xs="http://www.w3.org/2001/XMLSchema" xmlns:p="http://schemas.microsoft.com/office/2006/metadata/properties" xmlns:ns2="e5aeb5b9-f0ac-43fe-be4d-b709ab7af9db" xmlns:ns3="http://schemas.microsoft.com/sharepoint/v3/fields" xmlns:ns4="9030490b-a065-445c-b4f2-893993bd2fc8" targetNamespace="http://schemas.microsoft.com/office/2006/metadata/properties" ma:root="true" ma:fieldsID="b71b621e3afbe27328e6d52290f00e86" ns2:_="" ns3:_="" ns4:_="">
     <xsd:import namespace="e5aeb5b9-f0ac-43fe-be4d-b709ab7af9db"/>
@@ -15419,6 +15477,36 @@
 </ct:contentTypeSchema>
 </file>
 
+<file path=customXml/item2.xml><?xml version="1.0" encoding="utf-8"?>
+<p:properties xmlns:p="http://schemas.microsoft.com/office/2006/metadata/properties" xmlns:xsi="http://www.w3.org/2001/XMLSchema-instance" xmlns:pc="http://schemas.microsoft.com/office/infopath/2007/PartnerControls">
+  <documentManagement>
+    <TaskDueDate xmlns="http://schemas.microsoft.com/sharepoint/v3/fields" xsi:nil="true"/>
+    <Company xmlns="e5aeb5b9-f0ac-43fe-be4d-b709ab7af9db">19</Company>
+    <Responsible xmlns="e5aeb5b9-f0ac-43fe-be4d-b709ab7af9db">
+      <UserInfo>
+        <DisplayName/>
+        <AccountId xsi:nil="true"/>
+        <AccountType/>
+      </UserInfo>
+    </Responsible>
+    <TaxCatchAll xmlns="9030490b-a065-445c-b4f2-893993bd2fc8">
+      <Value>26</Value>
+    </TaxCatchAll>
+    <e6eaa2c09e154499b5a9dbe111cac137 xmlns="e5aeb5b9-f0ac-43fe-be4d-b709ab7af9db">
+      <Terms xmlns="http://schemas.microsoft.com/office/infopath/2007/PartnerControls">
+        <TermInfo xmlns="http://schemas.microsoft.com/office/infopath/2007/PartnerControls">
+          <TermName xmlns="http://schemas.microsoft.com/office/infopath/2007/PartnerControls">Documents</TermName>
+          <TermId xmlns="http://schemas.microsoft.com/office/infopath/2007/PartnerControls">51336ce3-f898-44a1-a9f6-ec04e30d07be</TermId>
+        </TermInfo>
+      </Terms>
+    </e6eaa2c09e154499b5a9dbe111cac137>
+    <TaxKeywordTaxHTField xmlns="9030490b-a065-445c-b4f2-893993bd2fc8">
+      <Terms xmlns="http://schemas.microsoft.com/office/infopath/2007/PartnerControls"/>
+    </TaxKeywordTaxHTField>
+  </documentManagement>
+</p:properties>
+</file>
+
 <file path=customXml/item3.xml><?xml version="1.0" encoding="utf-8"?>
 <?mso-contentType ?>
 <FormTemplates xmlns="http://schemas.microsoft.com/sharepoint/v3/contenttype/forms">
@@ -15429,18 +15517,6 @@
 </file>
 
 <file path=customXml/itemProps1.xml><?xml version="1.0" encoding="utf-8"?>
-<ds:datastoreItem xmlns:ds="http://schemas.openxmlformats.org/officeDocument/2006/customXml" ds:itemID="{AF1E1DA9-2716-4E75-9665-11EC25EA826D}">
-  <ds:schemaRefs>
-    <ds:schemaRef ds:uri="9030490b-a065-445c-b4f2-893993bd2fc8"/>
-    <ds:schemaRef ds:uri="e5aeb5b9-f0ac-43fe-be4d-b709ab7af9db"/>
-    <ds:schemaRef ds:uri="http://schemas.microsoft.com/office/2006/metadata/properties"/>
-    <ds:schemaRef ds:uri="http://schemas.microsoft.com/office/infopath/2007/PartnerControls"/>
-    <ds:schemaRef ds:uri="http://schemas.microsoft.com/sharepoint/v3/fields"/>
-  </ds:schemaRefs>
-</ds:datastoreItem>
-</file>
-
-<file path=customXml/itemProps2.xml><?xml version="1.0" encoding="utf-8"?>
 <ds:datastoreItem xmlns:ds="http://schemas.openxmlformats.org/officeDocument/2006/customXml" ds:itemID="{EF2F4CD6-5359-49F5-B3C3-7E55B265BA04}">
   <ds:schemaRefs>
     <ds:schemaRef ds:uri="9030490b-a065-445c-b4f2-893993bd2fc8"/>
@@ -15460,6 +15536,18 @@
 </ds:datastoreItem>
 </file>
 
+<file path=customXml/itemProps2.xml><?xml version="1.0" encoding="utf-8"?>
+<ds:datastoreItem xmlns:ds="http://schemas.openxmlformats.org/officeDocument/2006/customXml" ds:itemID="{AF1E1DA9-2716-4E75-9665-11EC25EA826D}">
+  <ds:schemaRefs>
+    <ds:schemaRef ds:uri="9030490b-a065-445c-b4f2-893993bd2fc8"/>
+    <ds:schemaRef ds:uri="e5aeb5b9-f0ac-43fe-be4d-b709ab7af9db"/>
+    <ds:schemaRef ds:uri="http://schemas.microsoft.com/office/2006/metadata/properties"/>
+    <ds:schemaRef ds:uri="http://schemas.microsoft.com/office/infopath/2007/PartnerControls"/>
+    <ds:schemaRef ds:uri="http://schemas.microsoft.com/sharepoint/v3/fields"/>
+  </ds:schemaRefs>
+</ds:datastoreItem>
+</file>
+
 <file path=customXml/itemProps3.xml><?xml version="1.0" encoding="utf-8"?>
 <ds:datastoreItem xmlns:ds="http://schemas.openxmlformats.org/officeDocument/2006/customXml" ds:itemID="{FA231495-DE18-4633-B151-B44EDA66405E}">
   <ds:schemaRefs>

</xml_diff>